<commit_message>
Changes in the ppt
</commit_message>
<xml_diff>
--- a/Project PPT.pptx
+++ b/Project PPT.pptx
@@ -7,21 +7,22 @@
     <p:sldMasterId id="2147483674" r:id="rId4"/>
     <p:sldMasterId id="2147483687" r:id="rId5"/>
     <p:sldMasterId id="2147483700" r:id="rId6"/>
+    <p:sldMasterId id="2147483713" r:id="rId7"/>
   </p:sldMasterIdLst>
   <p:sldIdLst>
-    <p:sldId id="256" r:id="rId7"/>
-    <p:sldId id="257" r:id="rId8"/>
-    <p:sldId id="258" r:id="rId9"/>
-    <p:sldId id="259" r:id="rId10"/>
-    <p:sldId id="260" r:id="rId11"/>
-    <p:sldId id="261" r:id="rId12"/>
-    <p:sldId id="262" r:id="rId13"/>
-    <p:sldId id="263" r:id="rId14"/>
-    <p:sldId id="264" r:id="rId15"/>
-    <p:sldId id="265" r:id="rId16"/>
-    <p:sldId id="266" r:id="rId17"/>
-    <p:sldId id="267" r:id="rId18"/>
-    <p:sldId id="268" r:id="rId19"/>
+    <p:sldId id="256" r:id="rId8"/>
+    <p:sldId id="257" r:id="rId9"/>
+    <p:sldId id="258" r:id="rId10"/>
+    <p:sldId id="259" r:id="rId11"/>
+    <p:sldId id="260" r:id="rId12"/>
+    <p:sldId id="261" r:id="rId13"/>
+    <p:sldId id="262" r:id="rId14"/>
+    <p:sldId id="263" r:id="rId15"/>
+    <p:sldId id="264" r:id="rId16"/>
+    <p:sldId id="265" r:id="rId17"/>
+    <p:sldId id="266" r:id="rId18"/>
+    <p:sldId id="267" r:id="rId19"/>
+    <p:sldId id="268" r:id="rId20"/>
   </p:sldIdLst>
   <p:sldSz cx="10080625" cy="7559675"/>
   <p:notesSz cx="7772400" cy="10058400"/>
@@ -6379,6 +6380,843 @@
 </p:sldLayout>
 </file>
 
+<file path=ppt/slideLayouts/slideLayout61.xml><?xml version="1.0" encoding="utf-8"?>
+<p:sldLayout xmlns:a="http://schemas.openxmlformats.org/drawingml/2006/main" xmlns:p="http://schemas.openxmlformats.org/presentationml/2006/main" xmlns:r="http://schemas.openxmlformats.org/officeDocument/2006/relationships" xmlns:p14="http://schemas.microsoft.com/office/powerpoint/2010/main" xmlns:p15="http://schemas.microsoft.com/office/powerpoint/2012/main" xmlns:mc="http://schemas.openxmlformats.org/markup-compatibility/2006" type="blank" preserve="1">
+  <p:cSld name="Blank Slide">
+    <p:spTree>
+      <p:nvGrpSpPr>
+        <p:cNvPr id="1" name=""/>
+        <p:cNvGrpSpPr/>
+        <p:nvPr/>
+      </p:nvGrpSpPr>
+      <p:grpSpPr>
+        <a:xfrm>
+          <a:off x="0" y="0"/>
+          <a:ext cx="0" cy="0"/>
+          <a:chOff x="0" y="0"/>
+          <a:chExt cx="0" cy="0"/>
+        </a:xfrm>
+      </p:grpSpPr>
+    </p:spTree>
+  </p:cSld>
+</p:sldLayout>
+</file>
+
+<file path=ppt/slideLayouts/slideLayout62.xml><?xml version="1.0" encoding="utf-8"?>
+<p:sldLayout xmlns:a="http://schemas.openxmlformats.org/drawingml/2006/main" xmlns:p="http://schemas.openxmlformats.org/presentationml/2006/main" xmlns:r="http://schemas.openxmlformats.org/officeDocument/2006/relationships" xmlns:p14="http://schemas.microsoft.com/office/powerpoint/2010/main" xmlns:p15="http://schemas.microsoft.com/office/powerpoint/2012/main" xmlns:mc="http://schemas.openxmlformats.org/markup-compatibility/2006" type="tx" preserve="1">
+  <p:cSld name="Title Slide">
+    <p:spTree>
+      <p:nvGrpSpPr>
+        <p:cNvPr id="1" name=""/>
+        <p:cNvGrpSpPr/>
+        <p:nvPr/>
+      </p:nvGrpSpPr>
+      <p:grpSpPr>
+        <a:xfrm>
+          <a:off x="0" y="0"/>
+          <a:ext cx="0" cy="0"/>
+          <a:chOff x="0" y="0"/>
+          <a:chExt cx="0" cy="0"/>
+        </a:xfrm>
+      </p:grpSpPr>
+      <p:sp>
+        <p:nvSpPr>
+          <p:cNvPr id="193" name="PlaceHolder 1"/>
+          <p:cNvSpPr>
+            <a:spLocks noGrp="1"/>
+          </p:cNvSpPr>
+          <p:nvPr>
+            <p:ph type="title"/>
+          </p:nvPr>
+        </p:nvSpPr>
+        <p:spPr>
+          <a:xfrm>
+            <a:off x="504000" y="301320"/>
+            <a:ext cx="9072000" cy="1261800"/>
+          </a:xfrm>
+          <a:prstGeom prst="rect">
+            <a:avLst/>
+          </a:prstGeom>
+        </p:spPr>
+        <p:txBody>
+          <a:bodyPr lIns="0" rIns="0" tIns="0" bIns="0" anchor="ctr">
+            <a:spAutoFit/>
+          </a:bodyPr>
+          <a:p>
+            <a:pPr algn="ctr"/>
+            <a:endParaRPr b="0" lang="en-IN" sz="4400" spc="-1" strike="noStrike">
+              <a:latin typeface="Arial"/>
+            </a:endParaRPr>
+          </a:p>
+        </p:txBody>
+      </p:sp>
+      <p:sp>
+        <p:nvSpPr>
+          <p:cNvPr id="194" name="PlaceHolder 2"/>
+          <p:cNvSpPr>
+            <a:spLocks noGrp="1"/>
+          </p:cNvSpPr>
+          <p:nvPr>
+            <p:ph type="subTitle"/>
+          </p:nvPr>
+        </p:nvSpPr>
+        <p:spPr>
+          <a:xfrm>
+            <a:off x="504000" y="1768680"/>
+            <a:ext cx="9072000" cy="4384080"/>
+          </a:xfrm>
+          <a:prstGeom prst="rect">
+            <a:avLst/>
+          </a:prstGeom>
+        </p:spPr>
+        <p:txBody>
+          <a:bodyPr lIns="0" rIns="0" tIns="0" bIns="0" anchor="ctr">
+            <a:spAutoFit/>
+          </a:bodyPr>
+          <a:p>
+            <a:pPr algn="ctr"/>
+            <a:endParaRPr b="0" lang="en-IN" sz="3200" spc="-1" strike="noStrike">
+              <a:latin typeface="Arial"/>
+            </a:endParaRPr>
+          </a:p>
+        </p:txBody>
+      </p:sp>
+    </p:spTree>
+  </p:cSld>
+</p:sldLayout>
+</file>
+
+<file path=ppt/slideLayouts/slideLayout63.xml><?xml version="1.0" encoding="utf-8"?>
+<p:sldLayout xmlns:a="http://schemas.openxmlformats.org/drawingml/2006/main" xmlns:p="http://schemas.openxmlformats.org/presentationml/2006/main" xmlns:r="http://schemas.openxmlformats.org/officeDocument/2006/relationships" xmlns:p14="http://schemas.microsoft.com/office/powerpoint/2010/main" xmlns:p15="http://schemas.microsoft.com/office/powerpoint/2012/main" xmlns:mc="http://schemas.openxmlformats.org/markup-compatibility/2006" type="obj" preserve="1">
+  <p:cSld name="Title, Content">
+    <p:spTree>
+      <p:nvGrpSpPr>
+        <p:cNvPr id="1" name=""/>
+        <p:cNvGrpSpPr/>
+        <p:nvPr/>
+      </p:nvGrpSpPr>
+      <p:grpSpPr>
+        <a:xfrm>
+          <a:off x="0" y="0"/>
+          <a:ext cx="0" cy="0"/>
+          <a:chOff x="0" y="0"/>
+          <a:chExt cx="0" cy="0"/>
+        </a:xfrm>
+      </p:grpSpPr>
+      <p:sp>
+        <p:nvSpPr>
+          <p:cNvPr id="195" name="PlaceHolder 1"/>
+          <p:cNvSpPr>
+            <a:spLocks noGrp="1"/>
+          </p:cNvSpPr>
+          <p:nvPr>
+            <p:ph type="title"/>
+          </p:nvPr>
+        </p:nvSpPr>
+        <p:spPr>
+          <a:xfrm>
+            <a:off x="504000" y="301320"/>
+            <a:ext cx="9072000" cy="1261800"/>
+          </a:xfrm>
+          <a:prstGeom prst="rect">
+            <a:avLst/>
+          </a:prstGeom>
+        </p:spPr>
+        <p:txBody>
+          <a:bodyPr lIns="0" rIns="0" tIns="0" bIns="0" anchor="ctr">
+            <a:spAutoFit/>
+          </a:bodyPr>
+          <a:p>
+            <a:pPr algn="ctr"/>
+            <a:endParaRPr b="0" lang="en-IN" sz="4400" spc="-1" strike="noStrike">
+              <a:latin typeface="Arial"/>
+            </a:endParaRPr>
+          </a:p>
+        </p:txBody>
+      </p:sp>
+      <p:sp>
+        <p:nvSpPr>
+          <p:cNvPr id="196" name="PlaceHolder 2"/>
+          <p:cNvSpPr>
+            <a:spLocks noGrp="1"/>
+          </p:cNvSpPr>
+          <p:nvPr>
+            <p:ph type="body"/>
+          </p:nvPr>
+        </p:nvSpPr>
+        <p:spPr>
+          <a:xfrm>
+            <a:off x="504000" y="1768680"/>
+            <a:ext cx="9072000" cy="4384080"/>
+          </a:xfrm>
+          <a:prstGeom prst="rect">
+            <a:avLst/>
+          </a:prstGeom>
+        </p:spPr>
+        <p:txBody>
+          <a:bodyPr lIns="0" rIns="0" tIns="0" bIns="0">
+            <a:normAutofit/>
+          </a:bodyPr>
+          <a:p>
+            <a:endParaRPr b="0" lang="en-IN" sz="3200" spc="-1" strike="noStrike">
+              <a:latin typeface="Arial"/>
+            </a:endParaRPr>
+          </a:p>
+        </p:txBody>
+      </p:sp>
+    </p:spTree>
+  </p:cSld>
+</p:sldLayout>
+</file>
+
+<file path=ppt/slideLayouts/slideLayout64.xml><?xml version="1.0" encoding="utf-8"?>
+<p:sldLayout xmlns:a="http://schemas.openxmlformats.org/drawingml/2006/main" xmlns:p="http://schemas.openxmlformats.org/presentationml/2006/main" xmlns:r="http://schemas.openxmlformats.org/officeDocument/2006/relationships" xmlns:p14="http://schemas.microsoft.com/office/powerpoint/2010/main" xmlns:p15="http://schemas.microsoft.com/office/powerpoint/2012/main" xmlns:mc="http://schemas.openxmlformats.org/markup-compatibility/2006" type="twoObj" preserve="1">
+  <p:cSld name="Title, 2 Content">
+    <p:spTree>
+      <p:nvGrpSpPr>
+        <p:cNvPr id="1" name=""/>
+        <p:cNvGrpSpPr/>
+        <p:nvPr/>
+      </p:nvGrpSpPr>
+      <p:grpSpPr>
+        <a:xfrm>
+          <a:off x="0" y="0"/>
+          <a:ext cx="0" cy="0"/>
+          <a:chOff x="0" y="0"/>
+          <a:chExt cx="0" cy="0"/>
+        </a:xfrm>
+      </p:grpSpPr>
+      <p:sp>
+        <p:nvSpPr>
+          <p:cNvPr id="197" name="PlaceHolder 1"/>
+          <p:cNvSpPr>
+            <a:spLocks noGrp="1"/>
+          </p:cNvSpPr>
+          <p:nvPr>
+            <p:ph type="title"/>
+          </p:nvPr>
+        </p:nvSpPr>
+        <p:spPr>
+          <a:xfrm>
+            <a:off x="504000" y="301320"/>
+            <a:ext cx="9072000" cy="1261800"/>
+          </a:xfrm>
+          <a:prstGeom prst="rect">
+            <a:avLst/>
+          </a:prstGeom>
+        </p:spPr>
+        <p:txBody>
+          <a:bodyPr lIns="0" rIns="0" tIns="0" bIns="0" anchor="ctr">
+            <a:spAutoFit/>
+          </a:bodyPr>
+          <a:p>
+            <a:pPr algn="ctr"/>
+            <a:endParaRPr b="0" lang="en-IN" sz="4400" spc="-1" strike="noStrike">
+              <a:latin typeface="Arial"/>
+            </a:endParaRPr>
+          </a:p>
+        </p:txBody>
+      </p:sp>
+      <p:sp>
+        <p:nvSpPr>
+          <p:cNvPr id="198" name="PlaceHolder 2"/>
+          <p:cNvSpPr>
+            <a:spLocks noGrp="1"/>
+          </p:cNvSpPr>
+          <p:nvPr>
+            <p:ph type="body"/>
+          </p:nvPr>
+        </p:nvSpPr>
+        <p:spPr>
+          <a:xfrm>
+            <a:off x="504000" y="1768680"/>
+            <a:ext cx="4426920" cy="4384080"/>
+          </a:xfrm>
+          <a:prstGeom prst="rect">
+            <a:avLst/>
+          </a:prstGeom>
+        </p:spPr>
+        <p:txBody>
+          <a:bodyPr lIns="0" rIns="0" tIns="0" bIns="0">
+            <a:normAutofit/>
+          </a:bodyPr>
+          <a:p>
+            <a:endParaRPr b="0" lang="en-IN" sz="3200" spc="-1" strike="noStrike">
+              <a:latin typeface="Arial"/>
+            </a:endParaRPr>
+          </a:p>
+        </p:txBody>
+      </p:sp>
+      <p:sp>
+        <p:nvSpPr>
+          <p:cNvPr id="199" name="PlaceHolder 3"/>
+          <p:cNvSpPr>
+            <a:spLocks noGrp="1"/>
+          </p:cNvSpPr>
+          <p:nvPr>
+            <p:ph type="body"/>
+          </p:nvPr>
+        </p:nvSpPr>
+        <p:spPr>
+          <a:xfrm>
+            <a:off x="5152680" y="1768680"/>
+            <a:ext cx="4426920" cy="4384080"/>
+          </a:xfrm>
+          <a:prstGeom prst="rect">
+            <a:avLst/>
+          </a:prstGeom>
+        </p:spPr>
+        <p:txBody>
+          <a:bodyPr lIns="0" rIns="0" tIns="0" bIns="0">
+            <a:normAutofit/>
+          </a:bodyPr>
+          <a:p>
+            <a:endParaRPr b="0" lang="en-IN" sz="3200" spc="-1" strike="noStrike">
+              <a:latin typeface="Arial"/>
+            </a:endParaRPr>
+          </a:p>
+        </p:txBody>
+      </p:sp>
+    </p:spTree>
+  </p:cSld>
+</p:sldLayout>
+</file>
+
+<file path=ppt/slideLayouts/slideLayout65.xml><?xml version="1.0" encoding="utf-8"?>
+<p:sldLayout xmlns:a="http://schemas.openxmlformats.org/drawingml/2006/main" xmlns:p="http://schemas.openxmlformats.org/presentationml/2006/main" xmlns:r="http://schemas.openxmlformats.org/officeDocument/2006/relationships" xmlns:p14="http://schemas.microsoft.com/office/powerpoint/2010/main" xmlns:p15="http://schemas.microsoft.com/office/powerpoint/2012/main" xmlns:mc="http://schemas.openxmlformats.org/markup-compatibility/2006" type="titleOnly" preserve="1">
+  <p:cSld name="Title Only">
+    <p:spTree>
+      <p:nvGrpSpPr>
+        <p:cNvPr id="1" name=""/>
+        <p:cNvGrpSpPr/>
+        <p:nvPr/>
+      </p:nvGrpSpPr>
+      <p:grpSpPr>
+        <a:xfrm>
+          <a:off x="0" y="0"/>
+          <a:ext cx="0" cy="0"/>
+          <a:chOff x="0" y="0"/>
+          <a:chExt cx="0" cy="0"/>
+        </a:xfrm>
+      </p:grpSpPr>
+      <p:sp>
+        <p:nvSpPr>
+          <p:cNvPr id="200" name="PlaceHolder 1"/>
+          <p:cNvSpPr>
+            <a:spLocks noGrp="1"/>
+          </p:cNvSpPr>
+          <p:nvPr>
+            <p:ph type="title"/>
+          </p:nvPr>
+        </p:nvSpPr>
+        <p:spPr>
+          <a:xfrm>
+            <a:off x="504000" y="301320"/>
+            <a:ext cx="9072000" cy="1261800"/>
+          </a:xfrm>
+          <a:prstGeom prst="rect">
+            <a:avLst/>
+          </a:prstGeom>
+        </p:spPr>
+        <p:txBody>
+          <a:bodyPr lIns="0" rIns="0" tIns="0" bIns="0" anchor="ctr">
+            <a:spAutoFit/>
+          </a:bodyPr>
+          <a:p>
+            <a:pPr algn="ctr"/>
+            <a:endParaRPr b="0" lang="en-IN" sz="4400" spc="-1" strike="noStrike">
+              <a:latin typeface="Arial"/>
+            </a:endParaRPr>
+          </a:p>
+        </p:txBody>
+      </p:sp>
+    </p:spTree>
+  </p:cSld>
+</p:sldLayout>
+</file>
+
+<file path=ppt/slideLayouts/slideLayout66.xml><?xml version="1.0" encoding="utf-8"?>
+<p:sldLayout xmlns:a="http://schemas.openxmlformats.org/drawingml/2006/main" xmlns:p="http://schemas.openxmlformats.org/presentationml/2006/main" xmlns:r="http://schemas.openxmlformats.org/officeDocument/2006/relationships" xmlns:p14="http://schemas.microsoft.com/office/powerpoint/2010/main" xmlns:p15="http://schemas.microsoft.com/office/powerpoint/2012/main" xmlns:mc="http://schemas.openxmlformats.org/markup-compatibility/2006" type="objOnly" preserve="1">
+  <p:cSld name="Centered Text">
+    <p:spTree>
+      <p:nvGrpSpPr>
+        <p:cNvPr id="1" name=""/>
+        <p:cNvGrpSpPr/>
+        <p:nvPr/>
+      </p:nvGrpSpPr>
+      <p:grpSpPr>
+        <a:xfrm>
+          <a:off x="0" y="0"/>
+          <a:ext cx="0" cy="0"/>
+          <a:chOff x="0" y="0"/>
+          <a:chExt cx="0" cy="0"/>
+        </a:xfrm>
+      </p:grpSpPr>
+      <p:sp>
+        <p:nvSpPr>
+          <p:cNvPr id="201" name="PlaceHolder 1"/>
+          <p:cNvSpPr>
+            <a:spLocks noGrp="1"/>
+          </p:cNvSpPr>
+          <p:nvPr>
+            <p:ph type="subTitle"/>
+          </p:nvPr>
+        </p:nvSpPr>
+        <p:spPr>
+          <a:xfrm>
+            <a:off x="504000" y="301320"/>
+            <a:ext cx="9072000" cy="5850360"/>
+          </a:xfrm>
+          <a:prstGeom prst="rect">
+            <a:avLst/>
+          </a:prstGeom>
+        </p:spPr>
+        <p:txBody>
+          <a:bodyPr lIns="0" rIns="0" tIns="0" bIns="0" anchor="ctr">
+            <a:spAutoFit/>
+          </a:bodyPr>
+          <a:p>
+            <a:pPr algn="ctr"/>
+            <a:endParaRPr b="0" lang="en-IN" sz="3200" spc="-1" strike="noStrike">
+              <a:latin typeface="Arial"/>
+            </a:endParaRPr>
+          </a:p>
+        </p:txBody>
+      </p:sp>
+    </p:spTree>
+  </p:cSld>
+</p:sldLayout>
+</file>
+
+<file path=ppt/slideLayouts/slideLayout67.xml><?xml version="1.0" encoding="utf-8"?>
+<p:sldLayout xmlns:a="http://schemas.openxmlformats.org/drawingml/2006/main" xmlns:p="http://schemas.openxmlformats.org/presentationml/2006/main" xmlns:r="http://schemas.openxmlformats.org/officeDocument/2006/relationships" xmlns:p14="http://schemas.microsoft.com/office/powerpoint/2010/main" xmlns:p15="http://schemas.microsoft.com/office/powerpoint/2012/main" xmlns:mc="http://schemas.openxmlformats.org/markup-compatibility/2006" type="twoObjAndObj" preserve="1">
+  <p:cSld name="Title, 2 Content and Content">
+    <p:spTree>
+      <p:nvGrpSpPr>
+        <p:cNvPr id="1" name=""/>
+        <p:cNvGrpSpPr/>
+        <p:nvPr/>
+      </p:nvGrpSpPr>
+      <p:grpSpPr>
+        <a:xfrm>
+          <a:off x="0" y="0"/>
+          <a:ext cx="0" cy="0"/>
+          <a:chOff x="0" y="0"/>
+          <a:chExt cx="0" cy="0"/>
+        </a:xfrm>
+      </p:grpSpPr>
+      <p:sp>
+        <p:nvSpPr>
+          <p:cNvPr id="202" name="PlaceHolder 1"/>
+          <p:cNvSpPr>
+            <a:spLocks noGrp="1"/>
+          </p:cNvSpPr>
+          <p:nvPr>
+            <p:ph type="title"/>
+          </p:nvPr>
+        </p:nvSpPr>
+        <p:spPr>
+          <a:xfrm>
+            <a:off x="504000" y="301320"/>
+            <a:ext cx="9072000" cy="1261800"/>
+          </a:xfrm>
+          <a:prstGeom prst="rect">
+            <a:avLst/>
+          </a:prstGeom>
+        </p:spPr>
+        <p:txBody>
+          <a:bodyPr lIns="0" rIns="0" tIns="0" bIns="0" anchor="ctr">
+            <a:spAutoFit/>
+          </a:bodyPr>
+          <a:p>
+            <a:pPr algn="ctr"/>
+            <a:endParaRPr b="0" lang="en-IN" sz="4400" spc="-1" strike="noStrike">
+              <a:latin typeface="Arial"/>
+            </a:endParaRPr>
+          </a:p>
+        </p:txBody>
+      </p:sp>
+      <p:sp>
+        <p:nvSpPr>
+          <p:cNvPr id="203" name="PlaceHolder 2"/>
+          <p:cNvSpPr>
+            <a:spLocks noGrp="1"/>
+          </p:cNvSpPr>
+          <p:nvPr>
+            <p:ph type="body"/>
+          </p:nvPr>
+        </p:nvSpPr>
+        <p:spPr>
+          <a:xfrm>
+            <a:off x="504000" y="1768680"/>
+            <a:ext cx="4426920" cy="2090880"/>
+          </a:xfrm>
+          <a:prstGeom prst="rect">
+            <a:avLst/>
+          </a:prstGeom>
+        </p:spPr>
+        <p:txBody>
+          <a:bodyPr lIns="0" rIns="0" tIns="0" bIns="0">
+            <a:normAutofit/>
+          </a:bodyPr>
+          <a:p>
+            <a:endParaRPr b="0" lang="en-IN" sz="3200" spc="-1" strike="noStrike">
+              <a:latin typeface="Arial"/>
+            </a:endParaRPr>
+          </a:p>
+        </p:txBody>
+      </p:sp>
+      <p:sp>
+        <p:nvSpPr>
+          <p:cNvPr id="204" name="PlaceHolder 3"/>
+          <p:cNvSpPr>
+            <a:spLocks noGrp="1"/>
+          </p:cNvSpPr>
+          <p:nvPr>
+            <p:ph type="body"/>
+          </p:nvPr>
+        </p:nvSpPr>
+        <p:spPr>
+          <a:xfrm>
+            <a:off x="5152680" y="1768680"/>
+            <a:ext cx="4426920" cy="4384080"/>
+          </a:xfrm>
+          <a:prstGeom prst="rect">
+            <a:avLst/>
+          </a:prstGeom>
+        </p:spPr>
+        <p:txBody>
+          <a:bodyPr lIns="0" rIns="0" tIns="0" bIns="0">
+            <a:normAutofit/>
+          </a:bodyPr>
+          <a:p>
+            <a:endParaRPr b="0" lang="en-IN" sz="3200" spc="-1" strike="noStrike">
+              <a:latin typeface="Arial"/>
+            </a:endParaRPr>
+          </a:p>
+        </p:txBody>
+      </p:sp>
+      <p:sp>
+        <p:nvSpPr>
+          <p:cNvPr id="205" name="PlaceHolder 4"/>
+          <p:cNvSpPr>
+            <a:spLocks noGrp="1"/>
+          </p:cNvSpPr>
+          <p:nvPr>
+            <p:ph type="body"/>
+          </p:nvPr>
+        </p:nvSpPr>
+        <p:spPr>
+          <a:xfrm>
+            <a:off x="504000" y="4058640"/>
+            <a:ext cx="4426920" cy="2090880"/>
+          </a:xfrm>
+          <a:prstGeom prst="rect">
+            <a:avLst/>
+          </a:prstGeom>
+        </p:spPr>
+        <p:txBody>
+          <a:bodyPr lIns="0" rIns="0" tIns="0" bIns="0">
+            <a:normAutofit/>
+          </a:bodyPr>
+          <a:p>
+            <a:endParaRPr b="0" lang="en-IN" sz="3200" spc="-1" strike="noStrike">
+              <a:latin typeface="Arial"/>
+            </a:endParaRPr>
+          </a:p>
+        </p:txBody>
+      </p:sp>
+    </p:spTree>
+  </p:cSld>
+</p:sldLayout>
+</file>
+
+<file path=ppt/slideLayouts/slideLayout68.xml><?xml version="1.0" encoding="utf-8"?>
+<p:sldLayout xmlns:a="http://schemas.openxmlformats.org/drawingml/2006/main" xmlns:p="http://schemas.openxmlformats.org/presentationml/2006/main" xmlns:r="http://schemas.openxmlformats.org/officeDocument/2006/relationships" xmlns:p14="http://schemas.microsoft.com/office/powerpoint/2010/main" xmlns:p15="http://schemas.microsoft.com/office/powerpoint/2012/main" xmlns:mc="http://schemas.openxmlformats.org/markup-compatibility/2006" type="objAndTwoObj" preserve="1">
+  <p:cSld name="Title Content and 2 Content">
+    <p:spTree>
+      <p:nvGrpSpPr>
+        <p:cNvPr id="1" name=""/>
+        <p:cNvGrpSpPr/>
+        <p:nvPr/>
+      </p:nvGrpSpPr>
+      <p:grpSpPr>
+        <a:xfrm>
+          <a:off x="0" y="0"/>
+          <a:ext cx="0" cy="0"/>
+          <a:chOff x="0" y="0"/>
+          <a:chExt cx="0" cy="0"/>
+        </a:xfrm>
+      </p:grpSpPr>
+      <p:sp>
+        <p:nvSpPr>
+          <p:cNvPr id="206" name="PlaceHolder 1"/>
+          <p:cNvSpPr>
+            <a:spLocks noGrp="1"/>
+          </p:cNvSpPr>
+          <p:nvPr>
+            <p:ph type="title"/>
+          </p:nvPr>
+        </p:nvSpPr>
+        <p:spPr>
+          <a:xfrm>
+            <a:off x="504000" y="301320"/>
+            <a:ext cx="9072000" cy="1261800"/>
+          </a:xfrm>
+          <a:prstGeom prst="rect">
+            <a:avLst/>
+          </a:prstGeom>
+        </p:spPr>
+        <p:txBody>
+          <a:bodyPr lIns="0" rIns="0" tIns="0" bIns="0" anchor="ctr">
+            <a:spAutoFit/>
+          </a:bodyPr>
+          <a:p>
+            <a:pPr algn="ctr"/>
+            <a:endParaRPr b="0" lang="en-IN" sz="4400" spc="-1" strike="noStrike">
+              <a:latin typeface="Arial"/>
+            </a:endParaRPr>
+          </a:p>
+        </p:txBody>
+      </p:sp>
+      <p:sp>
+        <p:nvSpPr>
+          <p:cNvPr id="207" name="PlaceHolder 2"/>
+          <p:cNvSpPr>
+            <a:spLocks noGrp="1"/>
+          </p:cNvSpPr>
+          <p:nvPr>
+            <p:ph type="body"/>
+          </p:nvPr>
+        </p:nvSpPr>
+        <p:spPr>
+          <a:xfrm>
+            <a:off x="504000" y="1768680"/>
+            <a:ext cx="4426920" cy="4384080"/>
+          </a:xfrm>
+          <a:prstGeom prst="rect">
+            <a:avLst/>
+          </a:prstGeom>
+        </p:spPr>
+        <p:txBody>
+          <a:bodyPr lIns="0" rIns="0" tIns="0" bIns="0">
+            <a:normAutofit/>
+          </a:bodyPr>
+          <a:p>
+            <a:endParaRPr b="0" lang="en-IN" sz="3200" spc="-1" strike="noStrike">
+              <a:latin typeface="Arial"/>
+            </a:endParaRPr>
+          </a:p>
+        </p:txBody>
+      </p:sp>
+      <p:sp>
+        <p:nvSpPr>
+          <p:cNvPr id="208" name="PlaceHolder 3"/>
+          <p:cNvSpPr>
+            <a:spLocks noGrp="1"/>
+          </p:cNvSpPr>
+          <p:nvPr>
+            <p:ph type="body"/>
+          </p:nvPr>
+        </p:nvSpPr>
+        <p:spPr>
+          <a:xfrm>
+            <a:off x="5152680" y="1768680"/>
+            <a:ext cx="4426920" cy="2090880"/>
+          </a:xfrm>
+          <a:prstGeom prst="rect">
+            <a:avLst/>
+          </a:prstGeom>
+        </p:spPr>
+        <p:txBody>
+          <a:bodyPr lIns="0" rIns="0" tIns="0" bIns="0">
+            <a:normAutofit/>
+          </a:bodyPr>
+          <a:p>
+            <a:endParaRPr b="0" lang="en-IN" sz="3200" spc="-1" strike="noStrike">
+              <a:latin typeface="Arial"/>
+            </a:endParaRPr>
+          </a:p>
+        </p:txBody>
+      </p:sp>
+      <p:sp>
+        <p:nvSpPr>
+          <p:cNvPr id="209" name="PlaceHolder 4"/>
+          <p:cNvSpPr>
+            <a:spLocks noGrp="1"/>
+          </p:cNvSpPr>
+          <p:nvPr>
+            <p:ph type="body"/>
+          </p:nvPr>
+        </p:nvSpPr>
+        <p:spPr>
+          <a:xfrm>
+            <a:off x="5152680" y="4058640"/>
+            <a:ext cx="4426920" cy="2090880"/>
+          </a:xfrm>
+          <a:prstGeom prst="rect">
+            <a:avLst/>
+          </a:prstGeom>
+        </p:spPr>
+        <p:txBody>
+          <a:bodyPr lIns="0" rIns="0" tIns="0" bIns="0">
+            <a:normAutofit/>
+          </a:bodyPr>
+          <a:p>
+            <a:endParaRPr b="0" lang="en-IN" sz="3200" spc="-1" strike="noStrike">
+              <a:latin typeface="Arial"/>
+            </a:endParaRPr>
+          </a:p>
+        </p:txBody>
+      </p:sp>
+    </p:spTree>
+  </p:cSld>
+</p:sldLayout>
+</file>
+
+<file path=ppt/slideLayouts/slideLayout69.xml><?xml version="1.0" encoding="utf-8"?>
+<p:sldLayout xmlns:a="http://schemas.openxmlformats.org/drawingml/2006/main" xmlns:p="http://schemas.openxmlformats.org/presentationml/2006/main" xmlns:r="http://schemas.openxmlformats.org/officeDocument/2006/relationships" xmlns:p14="http://schemas.microsoft.com/office/powerpoint/2010/main" xmlns:p15="http://schemas.microsoft.com/office/powerpoint/2012/main" xmlns:mc="http://schemas.openxmlformats.org/markup-compatibility/2006" type="twoObjOverTx" preserve="1">
+  <p:cSld name="Title, 2 Content over Content">
+    <p:spTree>
+      <p:nvGrpSpPr>
+        <p:cNvPr id="1" name=""/>
+        <p:cNvGrpSpPr/>
+        <p:nvPr/>
+      </p:nvGrpSpPr>
+      <p:grpSpPr>
+        <a:xfrm>
+          <a:off x="0" y="0"/>
+          <a:ext cx="0" cy="0"/>
+          <a:chOff x="0" y="0"/>
+          <a:chExt cx="0" cy="0"/>
+        </a:xfrm>
+      </p:grpSpPr>
+      <p:sp>
+        <p:nvSpPr>
+          <p:cNvPr id="210" name="PlaceHolder 1"/>
+          <p:cNvSpPr>
+            <a:spLocks noGrp="1"/>
+          </p:cNvSpPr>
+          <p:nvPr>
+            <p:ph type="title"/>
+          </p:nvPr>
+        </p:nvSpPr>
+        <p:spPr>
+          <a:xfrm>
+            <a:off x="504000" y="301320"/>
+            <a:ext cx="9072000" cy="1261800"/>
+          </a:xfrm>
+          <a:prstGeom prst="rect">
+            <a:avLst/>
+          </a:prstGeom>
+        </p:spPr>
+        <p:txBody>
+          <a:bodyPr lIns="0" rIns="0" tIns="0" bIns="0" anchor="ctr">
+            <a:spAutoFit/>
+          </a:bodyPr>
+          <a:p>
+            <a:pPr algn="ctr"/>
+            <a:endParaRPr b="0" lang="en-IN" sz="4400" spc="-1" strike="noStrike">
+              <a:latin typeface="Arial"/>
+            </a:endParaRPr>
+          </a:p>
+        </p:txBody>
+      </p:sp>
+      <p:sp>
+        <p:nvSpPr>
+          <p:cNvPr id="211" name="PlaceHolder 2"/>
+          <p:cNvSpPr>
+            <a:spLocks noGrp="1"/>
+          </p:cNvSpPr>
+          <p:nvPr>
+            <p:ph type="body"/>
+          </p:nvPr>
+        </p:nvSpPr>
+        <p:spPr>
+          <a:xfrm>
+            <a:off x="504000" y="1768680"/>
+            <a:ext cx="4426920" cy="2090880"/>
+          </a:xfrm>
+          <a:prstGeom prst="rect">
+            <a:avLst/>
+          </a:prstGeom>
+        </p:spPr>
+        <p:txBody>
+          <a:bodyPr lIns="0" rIns="0" tIns="0" bIns="0">
+            <a:normAutofit/>
+          </a:bodyPr>
+          <a:p>
+            <a:endParaRPr b="0" lang="en-IN" sz="3200" spc="-1" strike="noStrike">
+              <a:latin typeface="Arial"/>
+            </a:endParaRPr>
+          </a:p>
+        </p:txBody>
+      </p:sp>
+      <p:sp>
+        <p:nvSpPr>
+          <p:cNvPr id="212" name="PlaceHolder 3"/>
+          <p:cNvSpPr>
+            <a:spLocks noGrp="1"/>
+          </p:cNvSpPr>
+          <p:nvPr>
+            <p:ph type="body"/>
+          </p:nvPr>
+        </p:nvSpPr>
+        <p:spPr>
+          <a:xfrm>
+            <a:off x="5152680" y="1768680"/>
+            <a:ext cx="4426920" cy="2090880"/>
+          </a:xfrm>
+          <a:prstGeom prst="rect">
+            <a:avLst/>
+          </a:prstGeom>
+        </p:spPr>
+        <p:txBody>
+          <a:bodyPr lIns="0" rIns="0" tIns="0" bIns="0">
+            <a:normAutofit/>
+          </a:bodyPr>
+          <a:p>
+            <a:endParaRPr b="0" lang="en-IN" sz="3200" spc="-1" strike="noStrike">
+              <a:latin typeface="Arial"/>
+            </a:endParaRPr>
+          </a:p>
+        </p:txBody>
+      </p:sp>
+      <p:sp>
+        <p:nvSpPr>
+          <p:cNvPr id="213" name="PlaceHolder 4"/>
+          <p:cNvSpPr>
+            <a:spLocks noGrp="1"/>
+          </p:cNvSpPr>
+          <p:nvPr>
+            <p:ph type="body"/>
+          </p:nvPr>
+        </p:nvSpPr>
+        <p:spPr>
+          <a:xfrm>
+            <a:off x="504000" y="4058640"/>
+            <a:ext cx="9072000" cy="2090880"/>
+          </a:xfrm>
+          <a:prstGeom prst="rect">
+            <a:avLst/>
+          </a:prstGeom>
+        </p:spPr>
+        <p:txBody>
+          <a:bodyPr lIns="0" rIns="0" tIns="0" bIns="0">
+            <a:normAutofit/>
+          </a:bodyPr>
+          <a:p>
+            <a:endParaRPr b="0" lang="en-IN" sz="3200" spc="-1" strike="noStrike">
+              <a:latin typeface="Arial"/>
+            </a:endParaRPr>
+          </a:p>
+        </p:txBody>
+      </p:sp>
+    </p:spTree>
+  </p:cSld>
+</p:sldLayout>
+</file>
+
 <file path=ppt/slideLayouts/slideLayout7.xml><?xml version="1.0" encoding="utf-8"?>
 <p:sldLayout xmlns:a="http://schemas.openxmlformats.org/drawingml/2006/main" xmlns:p="http://schemas.openxmlformats.org/presentationml/2006/main" xmlns:r="http://schemas.openxmlformats.org/officeDocument/2006/relationships" xmlns:p14="http://schemas.microsoft.com/office/powerpoint/2010/main" xmlns:p15="http://schemas.microsoft.com/office/powerpoint/2012/main" xmlns:mc="http://schemas.openxmlformats.org/markup-compatibility/2006" type="twoObjAndObj" preserve="1">
   <p:cSld name="Title, 2 Content and Content">
@@ -6501,6 +7339,525 @@
           <a:xfrm>
             <a:off x="504000" y="4058640"/>
             <a:ext cx="4426920" cy="2090880"/>
+          </a:xfrm>
+          <a:prstGeom prst="rect">
+            <a:avLst/>
+          </a:prstGeom>
+        </p:spPr>
+        <p:txBody>
+          <a:bodyPr lIns="0" rIns="0" tIns="0" bIns="0">
+            <a:normAutofit/>
+          </a:bodyPr>
+          <a:p>
+            <a:endParaRPr b="0" lang="en-IN" sz="3200" spc="-1" strike="noStrike">
+              <a:latin typeface="Arial"/>
+            </a:endParaRPr>
+          </a:p>
+        </p:txBody>
+      </p:sp>
+    </p:spTree>
+  </p:cSld>
+</p:sldLayout>
+</file>
+
+<file path=ppt/slideLayouts/slideLayout70.xml><?xml version="1.0" encoding="utf-8"?>
+<p:sldLayout xmlns:a="http://schemas.openxmlformats.org/drawingml/2006/main" xmlns:p="http://schemas.openxmlformats.org/presentationml/2006/main" xmlns:r="http://schemas.openxmlformats.org/officeDocument/2006/relationships" xmlns:p14="http://schemas.microsoft.com/office/powerpoint/2010/main" xmlns:p15="http://schemas.microsoft.com/office/powerpoint/2012/main" xmlns:mc="http://schemas.openxmlformats.org/markup-compatibility/2006" type="objOverTx" preserve="1">
+  <p:cSld name="Title, Content over Content">
+    <p:spTree>
+      <p:nvGrpSpPr>
+        <p:cNvPr id="1" name=""/>
+        <p:cNvGrpSpPr/>
+        <p:nvPr/>
+      </p:nvGrpSpPr>
+      <p:grpSpPr>
+        <a:xfrm>
+          <a:off x="0" y="0"/>
+          <a:ext cx="0" cy="0"/>
+          <a:chOff x="0" y="0"/>
+          <a:chExt cx="0" cy="0"/>
+        </a:xfrm>
+      </p:grpSpPr>
+      <p:sp>
+        <p:nvSpPr>
+          <p:cNvPr id="214" name="PlaceHolder 1"/>
+          <p:cNvSpPr>
+            <a:spLocks noGrp="1"/>
+          </p:cNvSpPr>
+          <p:nvPr>
+            <p:ph type="title"/>
+          </p:nvPr>
+        </p:nvSpPr>
+        <p:spPr>
+          <a:xfrm>
+            <a:off x="504000" y="301320"/>
+            <a:ext cx="9072000" cy="1261800"/>
+          </a:xfrm>
+          <a:prstGeom prst="rect">
+            <a:avLst/>
+          </a:prstGeom>
+        </p:spPr>
+        <p:txBody>
+          <a:bodyPr lIns="0" rIns="0" tIns="0" bIns="0" anchor="ctr">
+            <a:spAutoFit/>
+          </a:bodyPr>
+          <a:p>
+            <a:pPr algn="ctr"/>
+            <a:endParaRPr b="0" lang="en-IN" sz="4400" spc="-1" strike="noStrike">
+              <a:latin typeface="Arial"/>
+            </a:endParaRPr>
+          </a:p>
+        </p:txBody>
+      </p:sp>
+      <p:sp>
+        <p:nvSpPr>
+          <p:cNvPr id="215" name="PlaceHolder 2"/>
+          <p:cNvSpPr>
+            <a:spLocks noGrp="1"/>
+          </p:cNvSpPr>
+          <p:nvPr>
+            <p:ph type="body"/>
+          </p:nvPr>
+        </p:nvSpPr>
+        <p:spPr>
+          <a:xfrm>
+            <a:off x="504000" y="1768680"/>
+            <a:ext cx="9072000" cy="2090880"/>
+          </a:xfrm>
+          <a:prstGeom prst="rect">
+            <a:avLst/>
+          </a:prstGeom>
+        </p:spPr>
+        <p:txBody>
+          <a:bodyPr lIns="0" rIns="0" tIns="0" bIns="0">
+            <a:normAutofit/>
+          </a:bodyPr>
+          <a:p>
+            <a:endParaRPr b="0" lang="en-IN" sz="3200" spc="-1" strike="noStrike">
+              <a:latin typeface="Arial"/>
+            </a:endParaRPr>
+          </a:p>
+        </p:txBody>
+      </p:sp>
+      <p:sp>
+        <p:nvSpPr>
+          <p:cNvPr id="216" name="PlaceHolder 3"/>
+          <p:cNvSpPr>
+            <a:spLocks noGrp="1"/>
+          </p:cNvSpPr>
+          <p:nvPr>
+            <p:ph type="body"/>
+          </p:nvPr>
+        </p:nvSpPr>
+        <p:spPr>
+          <a:xfrm>
+            <a:off x="504000" y="4058640"/>
+            <a:ext cx="9072000" cy="2090880"/>
+          </a:xfrm>
+          <a:prstGeom prst="rect">
+            <a:avLst/>
+          </a:prstGeom>
+        </p:spPr>
+        <p:txBody>
+          <a:bodyPr lIns="0" rIns="0" tIns="0" bIns="0">
+            <a:normAutofit/>
+          </a:bodyPr>
+          <a:p>
+            <a:endParaRPr b="0" lang="en-IN" sz="3200" spc="-1" strike="noStrike">
+              <a:latin typeface="Arial"/>
+            </a:endParaRPr>
+          </a:p>
+        </p:txBody>
+      </p:sp>
+    </p:spTree>
+  </p:cSld>
+</p:sldLayout>
+</file>
+
+<file path=ppt/slideLayouts/slideLayout71.xml><?xml version="1.0" encoding="utf-8"?>
+<p:sldLayout xmlns:a="http://schemas.openxmlformats.org/drawingml/2006/main" xmlns:p="http://schemas.openxmlformats.org/presentationml/2006/main" xmlns:r="http://schemas.openxmlformats.org/officeDocument/2006/relationships" xmlns:p14="http://schemas.microsoft.com/office/powerpoint/2010/main" xmlns:p15="http://schemas.microsoft.com/office/powerpoint/2012/main" xmlns:mc="http://schemas.openxmlformats.org/markup-compatibility/2006" type="fourObj" preserve="1">
+  <p:cSld name="Title, 4 Content">
+    <p:spTree>
+      <p:nvGrpSpPr>
+        <p:cNvPr id="1" name=""/>
+        <p:cNvGrpSpPr/>
+        <p:nvPr/>
+      </p:nvGrpSpPr>
+      <p:grpSpPr>
+        <a:xfrm>
+          <a:off x="0" y="0"/>
+          <a:ext cx="0" cy="0"/>
+          <a:chOff x="0" y="0"/>
+          <a:chExt cx="0" cy="0"/>
+        </a:xfrm>
+      </p:grpSpPr>
+      <p:sp>
+        <p:nvSpPr>
+          <p:cNvPr id="217" name="PlaceHolder 1"/>
+          <p:cNvSpPr>
+            <a:spLocks noGrp="1"/>
+          </p:cNvSpPr>
+          <p:nvPr>
+            <p:ph type="title"/>
+          </p:nvPr>
+        </p:nvSpPr>
+        <p:spPr>
+          <a:xfrm>
+            <a:off x="504000" y="301320"/>
+            <a:ext cx="9072000" cy="1261800"/>
+          </a:xfrm>
+          <a:prstGeom prst="rect">
+            <a:avLst/>
+          </a:prstGeom>
+        </p:spPr>
+        <p:txBody>
+          <a:bodyPr lIns="0" rIns="0" tIns="0" bIns="0" anchor="ctr">
+            <a:spAutoFit/>
+          </a:bodyPr>
+          <a:p>
+            <a:pPr algn="ctr"/>
+            <a:endParaRPr b="0" lang="en-IN" sz="4400" spc="-1" strike="noStrike">
+              <a:latin typeface="Arial"/>
+            </a:endParaRPr>
+          </a:p>
+        </p:txBody>
+      </p:sp>
+      <p:sp>
+        <p:nvSpPr>
+          <p:cNvPr id="218" name="PlaceHolder 2"/>
+          <p:cNvSpPr>
+            <a:spLocks noGrp="1"/>
+          </p:cNvSpPr>
+          <p:nvPr>
+            <p:ph type="body"/>
+          </p:nvPr>
+        </p:nvSpPr>
+        <p:spPr>
+          <a:xfrm>
+            <a:off x="504000" y="1768680"/>
+            <a:ext cx="4426920" cy="2090880"/>
+          </a:xfrm>
+          <a:prstGeom prst="rect">
+            <a:avLst/>
+          </a:prstGeom>
+        </p:spPr>
+        <p:txBody>
+          <a:bodyPr lIns="0" rIns="0" tIns="0" bIns="0">
+            <a:normAutofit/>
+          </a:bodyPr>
+          <a:p>
+            <a:endParaRPr b="0" lang="en-IN" sz="3200" spc="-1" strike="noStrike">
+              <a:latin typeface="Arial"/>
+            </a:endParaRPr>
+          </a:p>
+        </p:txBody>
+      </p:sp>
+      <p:sp>
+        <p:nvSpPr>
+          <p:cNvPr id="219" name="PlaceHolder 3"/>
+          <p:cNvSpPr>
+            <a:spLocks noGrp="1"/>
+          </p:cNvSpPr>
+          <p:nvPr>
+            <p:ph type="body"/>
+          </p:nvPr>
+        </p:nvSpPr>
+        <p:spPr>
+          <a:xfrm>
+            <a:off x="5152680" y="1768680"/>
+            <a:ext cx="4426920" cy="2090880"/>
+          </a:xfrm>
+          <a:prstGeom prst="rect">
+            <a:avLst/>
+          </a:prstGeom>
+        </p:spPr>
+        <p:txBody>
+          <a:bodyPr lIns="0" rIns="0" tIns="0" bIns="0">
+            <a:normAutofit/>
+          </a:bodyPr>
+          <a:p>
+            <a:endParaRPr b="0" lang="en-IN" sz="3200" spc="-1" strike="noStrike">
+              <a:latin typeface="Arial"/>
+            </a:endParaRPr>
+          </a:p>
+        </p:txBody>
+      </p:sp>
+      <p:sp>
+        <p:nvSpPr>
+          <p:cNvPr id="220" name="PlaceHolder 4"/>
+          <p:cNvSpPr>
+            <a:spLocks noGrp="1"/>
+          </p:cNvSpPr>
+          <p:nvPr>
+            <p:ph type="body"/>
+          </p:nvPr>
+        </p:nvSpPr>
+        <p:spPr>
+          <a:xfrm>
+            <a:off x="504000" y="4058640"/>
+            <a:ext cx="4426920" cy="2090880"/>
+          </a:xfrm>
+          <a:prstGeom prst="rect">
+            <a:avLst/>
+          </a:prstGeom>
+        </p:spPr>
+        <p:txBody>
+          <a:bodyPr lIns="0" rIns="0" tIns="0" bIns="0">
+            <a:normAutofit/>
+          </a:bodyPr>
+          <a:p>
+            <a:endParaRPr b="0" lang="en-IN" sz="3200" spc="-1" strike="noStrike">
+              <a:latin typeface="Arial"/>
+            </a:endParaRPr>
+          </a:p>
+        </p:txBody>
+      </p:sp>
+      <p:sp>
+        <p:nvSpPr>
+          <p:cNvPr id="221" name="PlaceHolder 5"/>
+          <p:cNvSpPr>
+            <a:spLocks noGrp="1"/>
+          </p:cNvSpPr>
+          <p:nvPr>
+            <p:ph type="body"/>
+          </p:nvPr>
+        </p:nvSpPr>
+        <p:spPr>
+          <a:xfrm>
+            <a:off x="5152680" y="4058640"/>
+            <a:ext cx="4426920" cy="2090880"/>
+          </a:xfrm>
+          <a:prstGeom prst="rect">
+            <a:avLst/>
+          </a:prstGeom>
+        </p:spPr>
+        <p:txBody>
+          <a:bodyPr lIns="0" rIns="0" tIns="0" bIns="0">
+            <a:normAutofit/>
+          </a:bodyPr>
+          <a:p>
+            <a:endParaRPr b="0" lang="en-IN" sz="3200" spc="-1" strike="noStrike">
+              <a:latin typeface="Arial"/>
+            </a:endParaRPr>
+          </a:p>
+        </p:txBody>
+      </p:sp>
+    </p:spTree>
+  </p:cSld>
+</p:sldLayout>
+</file>
+
+<file path=ppt/slideLayouts/slideLayout72.xml><?xml version="1.0" encoding="utf-8"?>
+<p:sldLayout xmlns:a="http://schemas.openxmlformats.org/drawingml/2006/main" xmlns:p="http://schemas.openxmlformats.org/presentationml/2006/main" xmlns:r="http://schemas.openxmlformats.org/officeDocument/2006/relationships" xmlns:p14="http://schemas.microsoft.com/office/powerpoint/2010/main" xmlns:p15="http://schemas.microsoft.com/office/powerpoint/2012/main" xmlns:mc="http://schemas.openxmlformats.org/markup-compatibility/2006" type="blank" preserve="1">
+  <p:cSld name="Title, 6 Content">
+    <p:spTree>
+      <p:nvGrpSpPr>
+        <p:cNvPr id="1" name=""/>
+        <p:cNvGrpSpPr/>
+        <p:nvPr/>
+      </p:nvGrpSpPr>
+      <p:grpSpPr>
+        <a:xfrm>
+          <a:off x="0" y="0"/>
+          <a:ext cx="0" cy="0"/>
+          <a:chOff x="0" y="0"/>
+          <a:chExt cx="0" cy="0"/>
+        </a:xfrm>
+      </p:grpSpPr>
+      <p:sp>
+        <p:nvSpPr>
+          <p:cNvPr id="222" name="PlaceHolder 1"/>
+          <p:cNvSpPr>
+            <a:spLocks noGrp="1"/>
+          </p:cNvSpPr>
+          <p:nvPr>
+            <p:ph type="title"/>
+          </p:nvPr>
+        </p:nvSpPr>
+        <p:spPr>
+          <a:xfrm>
+            <a:off x="504000" y="301320"/>
+            <a:ext cx="9072000" cy="1261800"/>
+          </a:xfrm>
+          <a:prstGeom prst="rect">
+            <a:avLst/>
+          </a:prstGeom>
+        </p:spPr>
+        <p:txBody>
+          <a:bodyPr lIns="0" rIns="0" tIns="0" bIns="0" anchor="ctr">
+            <a:spAutoFit/>
+          </a:bodyPr>
+          <a:p>
+            <a:pPr algn="ctr"/>
+            <a:endParaRPr b="0" lang="en-IN" sz="4400" spc="-1" strike="noStrike">
+              <a:latin typeface="Arial"/>
+            </a:endParaRPr>
+          </a:p>
+        </p:txBody>
+      </p:sp>
+      <p:sp>
+        <p:nvSpPr>
+          <p:cNvPr id="223" name="PlaceHolder 2"/>
+          <p:cNvSpPr>
+            <a:spLocks noGrp="1"/>
+          </p:cNvSpPr>
+          <p:nvPr>
+            <p:ph type="body"/>
+          </p:nvPr>
+        </p:nvSpPr>
+        <p:spPr>
+          <a:xfrm>
+            <a:off x="504000" y="1768680"/>
+            <a:ext cx="2921040" cy="2090880"/>
+          </a:xfrm>
+          <a:prstGeom prst="rect">
+            <a:avLst/>
+          </a:prstGeom>
+        </p:spPr>
+        <p:txBody>
+          <a:bodyPr lIns="0" rIns="0" tIns="0" bIns="0">
+            <a:normAutofit/>
+          </a:bodyPr>
+          <a:p>
+            <a:endParaRPr b="0" lang="en-IN" sz="3200" spc="-1" strike="noStrike">
+              <a:latin typeface="Arial"/>
+            </a:endParaRPr>
+          </a:p>
+        </p:txBody>
+      </p:sp>
+      <p:sp>
+        <p:nvSpPr>
+          <p:cNvPr id="224" name="PlaceHolder 3"/>
+          <p:cNvSpPr>
+            <a:spLocks noGrp="1"/>
+          </p:cNvSpPr>
+          <p:nvPr>
+            <p:ph type="body"/>
+          </p:nvPr>
+        </p:nvSpPr>
+        <p:spPr>
+          <a:xfrm>
+            <a:off x="3571560" y="1768680"/>
+            <a:ext cx="2921040" cy="2090880"/>
+          </a:xfrm>
+          <a:prstGeom prst="rect">
+            <a:avLst/>
+          </a:prstGeom>
+        </p:spPr>
+        <p:txBody>
+          <a:bodyPr lIns="0" rIns="0" tIns="0" bIns="0">
+            <a:normAutofit/>
+          </a:bodyPr>
+          <a:p>
+            <a:endParaRPr b="0" lang="en-IN" sz="3200" spc="-1" strike="noStrike">
+              <a:latin typeface="Arial"/>
+            </a:endParaRPr>
+          </a:p>
+        </p:txBody>
+      </p:sp>
+      <p:sp>
+        <p:nvSpPr>
+          <p:cNvPr id="225" name="PlaceHolder 4"/>
+          <p:cNvSpPr>
+            <a:spLocks noGrp="1"/>
+          </p:cNvSpPr>
+          <p:nvPr>
+            <p:ph type="body"/>
+          </p:nvPr>
+        </p:nvSpPr>
+        <p:spPr>
+          <a:xfrm>
+            <a:off x="6639120" y="1768680"/>
+            <a:ext cx="2921040" cy="2090880"/>
+          </a:xfrm>
+          <a:prstGeom prst="rect">
+            <a:avLst/>
+          </a:prstGeom>
+        </p:spPr>
+        <p:txBody>
+          <a:bodyPr lIns="0" rIns="0" tIns="0" bIns="0">
+            <a:normAutofit/>
+          </a:bodyPr>
+          <a:p>
+            <a:endParaRPr b="0" lang="en-IN" sz="3200" spc="-1" strike="noStrike">
+              <a:latin typeface="Arial"/>
+            </a:endParaRPr>
+          </a:p>
+        </p:txBody>
+      </p:sp>
+      <p:sp>
+        <p:nvSpPr>
+          <p:cNvPr id="226" name="PlaceHolder 5"/>
+          <p:cNvSpPr>
+            <a:spLocks noGrp="1"/>
+          </p:cNvSpPr>
+          <p:nvPr>
+            <p:ph type="body"/>
+          </p:nvPr>
+        </p:nvSpPr>
+        <p:spPr>
+          <a:xfrm>
+            <a:off x="504000" y="4058640"/>
+            <a:ext cx="2921040" cy="2090880"/>
+          </a:xfrm>
+          <a:prstGeom prst="rect">
+            <a:avLst/>
+          </a:prstGeom>
+        </p:spPr>
+        <p:txBody>
+          <a:bodyPr lIns="0" rIns="0" tIns="0" bIns="0">
+            <a:normAutofit/>
+          </a:bodyPr>
+          <a:p>
+            <a:endParaRPr b="0" lang="en-IN" sz="3200" spc="-1" strike="noStrike">
+              <a:latin typeface="Arial"/>
+            </a:endParaRPr>
+          </a:p>
+        </p:txBody>
+      </p:sp>
+      <p:sp>
+        <p:nvSpPr>
+          <p:cNvPr id="227" name="PlaceHolder 6"/>
+          <p:cNvSpPr>
+            <a:spLocks noGrp="1"/>
+          </p:cNvSpPr>
+          <p:nvPr>
+            <p:ph type="body"/>
+          </p:nvPr>
+        </p:nvSpPr>
+        <p:spPr>
+          <a:xfrm>
+            <a:off x="3571560" y="4058640"/>
+            <a:ext cx="2921040" cy="2090880"/>
+          </a:xfrm>
+          <a:prstGeom prst="rect">
+            <a:avLst/>
+          </a:prstGeom>
+        </p:spPr>
+        <p:txBody>
+          <a:bodyPr lIns="0" rIns="0" tIns="0" bIns="0">
+            <a:normAutofit/>
+          </a:bodyPr>
+          <a:p>
+            <a:endParaRPr b="0" lang="en-IN" sz="3200" spc="-1" strike="noStrike">
+              <a:latin typeface="Arial"/>
+            </a:endParaRPr>
+          </a:p>
+        </p:txBody>
+      </p:sp>
+      <p:sp>
+        <p:nvSpPr>
+          <p:cNvPr id="228" name="PlaceHolder 7"/>
+          <p:cNvSpPr>
+            <a:spLocks noGrp="1"/>
+          </p:cNvSpPr>
+          <p:nvPr>
+            <p:ph type="body"/>
+          </p:nvPr>
+        </p:nvSpPr>
+        <p:spPr>
+          <a:xfrm>
+            <a:off x="6639120" y="4058640"/>
+            <a:ext cx="2921040" cy="2090880"/>
           </a:xfrm>
           <a:prstGeom prst="rect">
             <a:avLst/>
@@ -6847,8 +8204,8 @@
         </p:nvSpPr>
         <p:spPr>
           <a:xfrm>
-            <a:off x="504000" y="1312560"/>
-            <a:ext cx="9071280" cy="1262160"/>
+            <a:off x="504000" y="300960"/>
+            <a:ext cx="9071640" cy="1262160"/>
           </a:xfrm>
           <a:prstGeom prst="rect">
             <a:avLst/>
@@ -6884,7 +8241,7 @@
         <p:spPr>
           <a:xfrm>
             <a:off x="504000" y="1768680"/>
-            <a:ext cx="9072000" cy="4384080"/>
+            <a:ext cx="9071640" cy="4383720"/>
           </a:xfrm>
           <a:prstGeom prst="rect">
             <a:avLst/>
@@ -6907,12 +8264,12 @@
               <a:buChar char=""/>
             </a:pPr>
             <a:r>
-              <a:rPr b="0" lang="en-IN" sz="3200" spc="-1" strike="noStrike">
+              <a:rPr b="0" lang="en-IN" sz="1800" spc="-1" strike="noStrike">
                 <a:latin typeface="Arial"/>
               </a:rPr>
               <a:t>Click to edit the outline text format</a:t>
             </a:r>
-            <a:endParaRPr b="0" lang="en-IN" sz="3200" spc="-1" strike="noStrike">
+            <a:endParaRPr b="0" lang="en-IN" sz="1800" spc="-1" strike="noStrike">
               <a:latin typeface="Arial"/>
             </a:endParaRPr>
           </a:p>
@@ -6929,12 +8286,12 @@
               <a:buChar char=""/>
             </a:pPr>
             <a:r>
-              <a:rPr b="0" lang="en-IN" sz="2800" spc="-1" strike="noStrike">
+              <a:rPr b="0" lang="en-IN" sz="1800" spc="-1" strike="noStrike">
                 <a:latin typeface="Arial"/>
               </a:rPr>
               <a:t>Second Outline Level</a:t>
             </a:r>
-            <a:endParaRPr b="0" lang="en-IN" sz="2800" spc="-1" strike="noStrike">
+            <a:endParaRPr b="0" lang="en-IN" sz="1800" spc="-1" strike="noStrike">
               <a:latin typeface="Arial"/>
             </a:endParaRPr>
           </a:p>
@@ -6951,12 +8308,12 @@
               <a:buChar char=""/>
             </a:pPr>
             <a:r>
-              <a:rPr b="0" lang="en-IN" sz="2400" spc="-1" strike="noStrike">
+              <a:rPr b="0" lang="en-IN" sz="1800" spc="-1" strike="noStrike">
                 <a:latin typeface="Arial"/>
               </a:rPr>
               <a:t>Third Outline Level</a:t>
             </a:r>
-            <a:endParaRPr b="0" lang="en-IN" sz="2400" spc="-1" strike="noStrike">
+            <a:endParaRPr b="0" lang="en-IN" sz="1800" spc="-1" strike="noStrike">
               <a:latin typeface="Arial"/>
             </a:endParaRPr>
           </a:p>
@@ -6973,12 +8330,12 @@
               <a:buChar char=""/>
             </a:pPr>
             <a:r>
-              <a:rPr b="0" lang="en-IN" sz="2000" spc="-1" strike="noStrike">
+              <a:rPr b="0" lang="en-IN" sz="1800" spc="-1" strike="noStrike">
                 <a:latin typeface="Arial"/>
               </a:rPr>
               <a:t>Fourth Outline Level</a:t>
             </a:r>
-            <a:endParaRPr b="0" lang="en-IN" sz="2000" spc="-1" strike="noStrike">
+            <a:endParaRPr b="0" lang="en-IN" sz="1800" spc="-1" strike="noStrike">
               <a:latin typeface="Arial"/>
             </a:endParaRPr>
           </a:p>
@@ -6995,12 +8352,12 @@
               <a:buChar char=""/>
             </a:pPr>
             <a:r>
-              <a:rPr b="0" lang="en-IN" sz="2000" spc="-1" strike="noStrike">
+              <a:rPr b="0" lang="en-IN" sz="1800" spc="-1" strike="noStrike">
                 <a:latin typeface="Arial"/>
               </a:rPr>
               <a:t>Fifth Outline Level</a:t>
             </a:r>
-            <a:endParaRPr b="0" lang="en-IN" sz="2000" spc="-1" strike="noStrike">
+            <a:endParaRPr b="0" lang="en-IN" sz="1800" spc="-1" strike="noStrike">
               <a:latin typeface="Arial"/>
             </a:endParaRPr>
           </a:p>
@@ -7017,12 +8374,12 @@
               <a:buChar char=""/>
             </a:pPr>
             <a:r>
-              <a:rPr b="0" lang="en-IN" sz="2000" spc="-1" strike="noStrike">
+              <a:rPr b="0" lang="en-IN" sz="1800" spc="-1" strike="noStrike">
                 <a:latin typeface="Arial"/>
               </a:rPr>
               <a:t>Sixth Outline Level</a:t>
             </a:r>
-            <a:endParaRPr b="0" lang="en-IN" sz="2000" spc="-1" strike="noStrike">
+            <a:endParaRPr b="0" lang="en-IN" sz="1800" spc="-1" strike="noStrike">
               <a:latin typeface="Arial"/>
             </a:endParaRPr>
           </a:p>
@@ -7039,12 +8396,12 @@
               <a:buChar char=""/>
             </a:pPr>
             <a:r>
-              <a:rPr b="0" lang="en-IN" sz="2000" spc="-1" strike="noStrike">
+              <a:rPr b="0" lang="en-IN" sz="1800" spc="-1" strike="noStrike">
                 <a:latin typeface="Arial"/>
               </a:rPr>
               <a:t>Seventh Outline Level</a:t>
             </a:r>
-            <a:endParaRPr b="0" lang="en-IN" sz="2000" spc="-1" strike="noStrike">
+            <a:endParaRPr b="0" lang="en-IN" sz="1800" spc="-1" strike="noStrike">
               <a:latin typeface="Arial"/>
             </a:endParaRPr>
           </a:p>
@@ -7109,8 +8466,8 @@
         </p:nvSpPr>
         <p:spPr>
           <a:xfrm>
-            <a:off x="504000" y="1312560"/>
-            <a:ext cx="9071280" cy="1262160"/>
+            <a:off x="504000" y="300960"/>
+            <a:ext cx="9071640" cy="1262160"/>
           </a:xfrm>
           <a:prstGeom prst="rect">
             <a:avLst/>
@@ -7371,8 +8728,8 @@
         </p:nvSpPr>
         <p:spPr>
           <a:xfrm>
-            <a:off x="504000" y="1312560"/>
-            <a:ext cx="9071280" cy="1262160"/>
+            <a:off x="504000" y="301320"/>
+            <a:ext cx="9072000" cy="1261800"/>
           </a:xfrm>
           <a:prstGeom prst="rect">
             <a:avLst/>
@@ -7380,16 +8737,17 @@
         </p:spPr>
         <p:txBody>
           <a:bodyPr lIns="0" rIns="0" tIns="0" bIns="0" anchor="ctr">
-            <a:spAutoFit/>
-          </a:bodyPr>
-          <a:p>
+            <a:noAutofit/>
+          </a:bodyPr>
+          <a:p>
+            <a:pPr algn="ctr"/>
             <a:r>
-              <a:rPr b="0" lang="en-IN" sz="1800" spc="-1" strike="noStrike">
+              <a:rPr b="0" lang="en-IN" sz="4400" spc="-1" strike="noStrike">
                 <a:latin typeface="Arial"/>
               </a:rPr>
               <a:t>Click to edit the title text format</a:t>
             </a:r>
-            <a:endParaRPr b="0" lang="en-IN" sz="1800" spc="-1" strike="noStrike">
+            <a:endParaRPr b="0" lang="en-IN" sz="4400" spc="-1" strike="noStrike">
               <a:latin typeface="Arial"/>
             </a:endParaRPr>
           </a:p>
@@ -7407,8 +8765,8 @@
         </p:nvSpPr>
         <p:spPr>
           <a:xfrm>
-            <a:off x="504000" y="3168000"/>
-            <a:ext cx="9071280" cy="3671640"/>
+            <a:off x="504000" y="1768680"/>
+            <a:ext cx="9072000" cy="4384080"/>
           </a:xfrm>
           <a:prstGeom prst="rect">
             <a:avLst/>
@@ -7431,12 +8789,12 @@
               <a:buChar char=""/>
             </a:pPr>
             <a:r>
-              <a:rPr b="0" lang="en-IN" sz="1800" spc="-1" strike="noStrike">
+              <a:rPr b="0" lang="en-IN" sz="3200" spc="-1" strike="noStrike">
                 <a:latin typeface="Arial"/>
               </a:rPr>
               <a:t>Click to edit the outline text format</a:t>
             </a:r>
-            <a:endParaRPr b="0" lang="en-IN" sz="1800" spc="-1" strike="noStrike">
+            <a:endParaRPr b="0" lang="en-IN" sz="3200" spc="-1" strike="noStrike">
               <a:latin typeface="Arial"/>
             </a:endParaRPr>
           </a:p>
@@ -7453,12 +8811,12 @@
               <a:buChar char=""/>
             </a:pPr>
             <a:r>
-              <a:rPr b="0" lang="en-IN" sz="1800" spc="-1" strike="noStrike">
+              <a:rPr b="0" lang="en-IN" sz="2800" spc="-1" strike="noStrike">
                 <a:latin typeface="Arial"/>
               </a:rPr>
               <a:t>Second Outline Level</a:t>
             </a:r>
-            <a:endParaRPr b="0" lang="en-IN" sz="1800" spc="-1" strike="noStrike">
+            <a:endParaRPr b="0" lang="en-IN" sz="2800" spc="-1" strike="noStrike">
               <a:latin typeface="Arial"/>
             </a:endParaRPr>
           </a:p>
@@ -7475,12 +8833,12 @@
               <a:buChar char=""/>
             </a:pPr>
             <a:r>
-              <a:rPr b="0" lang="en-IN" sz="1800" spc="-1" strike="noStrike">
+              <a:rPr b="0" lang="en-IN" sz="2400" spc="-1" strike="noStrike">
                 <a:latin typeface="Arial"/>
               </a:rPr>
               <a:t>Third Outline Level</a:t>
             </a:r>
-            <a:endParaRPr b="0" lang="en-IN" sz="1800" spc="-1" strike="noStrike">
+            <a:endParaRPr b="0" lang="en-IN" sz="2400" spc="-1" strike="noStrike">
               <a:latin typeface="Arial"/>
             </a:endParaRPr>
           </a:p>
@@ -7497,12 +8855,12 @@
               <a:buChar char=""/>
             </a:pPr>
             <a:r>
-              <a:rPr b="0" lang="en-IN" sz="1800" spc="-1" strike="noStrike">
+              <a:rPr b="0" lang="en-IN" sz="2000" spc="-1" strike="noStrike">
                 <a:latin typeface="Arial"/>
               </a:rPr>
               <a:t>Fourth Outline Level</a:t>
             </a:r>
-            <a:endParaRPr b="0" lang="en-IN" sz="1800" spc="-1" strike="noStrike">
+            <a:endParaRPr b="0" lang="en-IN" sz="2000" spc="-1" strike="noStrike">
               <a:latin typeface="Arial"/>
             </a:endParaRPr>
           </a:p>
@@ -7519,12 +8877,12 @@
               <a:buChar char=""/>
             </a:pPr>
             <a:r>
-              <a:rPr b="0" lang="en-IN" sz="1800" spc="-1" strike="noStrike">
+              <a:rPr b="0" lang="en-IN" sz="2000" spc="-1" strike="noStrike">
                 <a:latin typeface="Arial"/>
               </a:rPr>
               <a:t>Fifth Outline Level</a:t>
             </a:r>
-            <a:endParaRPr b="0" lang="en-IN" sz="1800" spc="-1" strike="noStrike">
+            <a:endParaRPr b="0" lang="en-IN" sz="2000" spc="-1" strike="noStrike">
               <a:latin typeface="Arial"/>
             </a:endParaRPr>
           </a:p>
@@ -7541,12 +8899,12 @@
               <a:buChar char=""/>
             </a:pPr>
             <a:r>
-              <a:rPr b="0" lang="en-IN" sz="1800" spc="-1" strike="noStrike">
+              <a:rPr b="0" lang="en-IN" sz="2000" spc="-1" strike="noStrike">
                 <a:latin typeface="Arial"/>
               </a:rPr>
               <a:t>Sixth Outline Level</a:t>
             </a:r>
-            <a:endParaRPr b="0" lang="en-IN" sz="1800" spc="-1" strike="noStrike">
+            <a:endParaRPr b="0" lang="en-IN" sz="2000" spc="-1" strike="noStrike">
               <a:latin typeface="Arial"/>
             </a:endParaRPr>
           </a:p>
@@ -7563,12 +8921,12 @@
               <a:buChar char=""/>
             </a:pPr>
             <a:r>
-              <a:rPr b="0" lang="en-IN" sz="1800" spc="-1" strike="noStrike">
+              <a:rPr b="0" lang="en-IN" sz="2000" spc="-1" strike="noStrike">
                 <a:latin typeface="Arial"/>
               </a:rPr>
               <a:t>Seventh Outline Level</a:t>
             </a:r>
-            <a:endParaRPr b="0" lang="en-IN" sz="1800" spc="-1" strike="noStrike">
+            <a:endParaRPr b="0" lang="en-IN" sz="2000" spc="-1" strike="noStrike">
               <a:latin typeface="Arial"/>
             </a:endParaRPr>
           </a:p>
@@ -7633,8 +8991,8 @@
         </p:nvSpPr>
         <p:spPr>
           <a:xfrm>
-            <a:off x="504000" y="1312560"/>
-            <a:ext cx="9071280" cy="1262160"/>
+            <a:off x="504000" y="300960"/>
+            <a:ext cx="9071640" cy="1262160"/>
           </a:xfrm>
           <a:prstGeom prst="rect">
             <a:avLst/>
@@ -7669,8 +9027,8 @@
         </p:nvSpPr>
         <p:spPr>
           <a:xfrm>
-            <a:off x="504000" y="3168000"/>
-            <a:ext cx="4426560" cy="3671640"/>
+            <a:off x="504000" y="1768680"/>
+            <a:ext cx="4426560" cy="4383720"/>
           </a:xfrm>
           <a:prstGeom prst="rect">
             <a:avLst/>
@@ -7848,8 +9206,8 @@
         </p:nvSpPr>
         <p:spPr>
           <a:xfrm>
-            <a:off x="5152680" y="3168000"/>
-            <a:ext cx="4426560" cy="3671640"/>
+            <a:off x="5152680" y="1768680"/>
+            <a:ext cx="4426560" cy="4383720"/>
           </a:xfrm>
           <a:prstGeom prst="rect">
             <a:avLst/>
@@ -8074,6 +9432,268 @@
         </p:nvSpPr>
         <p:spPr>
           <a:xfrm>
+            <a:off x="504000" y="300960"/>
+            <a:ext cx="9071640" cy="1262160"/>
+          </a:xfrm>
+          <a:prstGeom prst="rect">
+            <a:avLst/>
+          </a:prstGeom>
+        </p:spPr>
+        <p:txBody>
+          <a:bodyPr lIns="0" rIns="0" tIns="0" bIns="0" anchor="ctr">
+            <a:spAutoFit/>
+          </a:bodyPr>
+          <a:p>
+            <a:r>
+              <a:rPr b="0" lang="en-IN" sz="1800" spc="-1" strike="noStrike">
+                <a:latin typeface="Arial"/>
+              </a:rPr>
+              <a:t>Click to edit the title text format</a:t>
+            </a:r>
+            <a:endParaRPr b="0" lang="en-IN" sz="1800" spc="-1" strike="noStrike">
+              <a:latin typeface="Arial"/>
+            </a:endParaRPr>
+          </a:p>
+        </p:txBody>
+      </p:sp>
+      <p:sp>
+        <p:nvSpPr>
+          <p:cNvPr id="154" name="PlaceHolder 2"/>
+          <p:cNvSpPr>
+            <a:spLocks noGrp="1"/>
+          </p:cNvSpPr>
+          <p:nvPr>
+            <p:ph type="body"/>
+          </p:nvPr>
+        </p:nvSpPr>
+        <p:spPr>
+          <a:xfrm>
+            <a:off x="504000" y="1768680"/>
+            <a:ext cx="9071640" cy="4383720"/>
+          </a:xfrm>
+          <a:prstGeom prst="rect">
+            <a:avLst/>
+          </a:prstGeom>
+        </p:spPr>
+        <p:txBody>
+          <a:bodyPr lIns="0" rIns="0" tIns="0" bIns="0">
+            <a:normAutofit/>
+          </a:bodyPr>
+          <a:p>
+            <a:pPr marL="432000" indent="-324000">
+              <a:spcBef>
+                <a:spcPts val="1417"/>
+              </a:spcBef>
+              <a:buClr>
+                <a:srgbClr val="000000"/>
+              </a:buClr>
+              <a:buSzPct val="45000"/>
+              <a:buFont typeface="Wingdings" charset="2"/>
+              <a:buChar char=""/>
+            </a:pPr>
+            <a:r>
+              <a:rPr b="0" lang="en-IN" sz="1800" spc="-1" strike="noStrike">
+                <a:latin typeface="Arial"/>
+              </a:rPr>
+              <a:t>Click to edit the outline text format</a:t>
+            </a:r>
+            <a:endParaRPr b="0" lang="en-IN" sz="1800" spc="-1" strike="noStrike">
+              <a:latin typeface="Arial"/>
+            </a:endParaRPr>
+          </a:p>
+          <a:p>
+            <a:pPr lvl="1" marL="864000" indent="-324000">
+              <a:spcBef>
+                <a:spcPts val="1134"/>
+              </a:spcBef>
+              <a:buClr>
+                <a:srgbClr val="000000"/>
+              </a:buClr>
+              <a:buSzPct val="75000"/>
+              <a:buFont typeface="Symbol" charset="2"/>
+              <a:buChar char=""/>
+            </a:pPr>
+            <a:r>
+              <a:rPr b="0" lang="en-IN" sz="1800" spc="-1" strike="noStrike">
+                <a:latin typeface="Arial"/>
+              </a:rPr>
+              <a:t>Second Outline Level</a:t>
+            </a:r>
+            <a:endParaRPr b="0" lang="en-IN" sz="1800" spc="-1" strike="noStrike">
+              <a:latin typeface="Arial"/>
+            </a:endParaRPr>
+          </a:p>
+          <a:p>
+            <a:pPr lvl="2" marL="1296000" indent="-288000">
+              <a:spcBef>
+                <a:spcPts val="850"/>
+              </a:spcBef>
+              <a:buClr>
+                <a:srgbClr val="000000"/>
+              </a:buClr>
+              <a:buSzPct val="45000"/>
+              <a:buFont typeface="Wingdings" charset="2"/>
+              <a:buChar char=""/>
+            </a:pPr>
+            <a:r>
+              <a:rPr b="0" lang="en-IN" sz="1800" spc="-1" strike="noStrike">
+                <a:latin typeface="Arial"/>
+              </a:rPr>
+              <a:t>Third Outline Level</a:t>
+            </a:r>
+            <a:endParaRPr b="0" lang="en-IN" sz="1800" spc="-1" strike="noStrike">
+              <a:latin typeface="Arial"/>
+            </a:endParaRPr>
+          </a:p>
+          <a:p>
+            <a:pPr lvl="3" marL="1728000" indent="-216000">
+              <a:spcBef>
+                <a:spcPts val="567"/>
+              </a:spcBef>
+              <a:buClr>
+                <a:srgbClr val="000000"/>
+              </a:buClr>
+              <a:buSzPct val="75000"/>
+              <a:buFont typeface="Symbol" charset="2"/>
+              <a:buChar char=""/>
+            </a:pPr>
+            <a:r>
+              <a:rPr b="0" lang="en-IN" sz="1800" spc="-1" strike="noStrike">
+                <a:latin typeface="Arial"/>
+              </a:rPr>
+              <a:t>Fourth Outline Level</a:t>
+            </a:r>
+            <a:endParaRPr b="0" lang="en-IN" sz="1800" spc="-1" strike="noStrike">
+              <a:latin typeface="Arial"/>
+            </a:endParaRPr>
+          </a:p>
+          <a:p>
+            <a:pPr lvl="4" marL="2160000" indent="-216000">
+              <a:spcBef>
+                <a:spcPts val="283"/>
+              </a:spcBef>
+              <a:buClr>
+                <a:srgbClr val="000000"/>
+              </a:buClr>
+              <a:buSzPct val="45000"/>
+              <a:buFont typeface="Wingdings" charset="2"/>
+              <a:buChar char=""/>
+            </a:pPr>
+            <a:r>
+              <a:rPr b="0" lang="en-IN" sz="1800" spc="-1" strike="noStrike">
+                <a:latin typeface="Arial"/>
+              </a:rPr>
+              <a:t>Fifth Outline Level</a:t>
+            </a:r>
+            <a:endParaRPr b="0" lang="en-IN" sz="1800" spc="-1" strike="noStrike">
+              <a:latin typeface="Arial"/>
+            </a:endParaRPr>
+          </a:p>
+          <a:p>
+            <a:pPr lvl="5" marL="2592000" indent="-216000">
+              <a:spcBef>
+                <a:spcPts val="283"/>
+              </a:spcBef>
+              <a:buClr>
+                <a:srgbClr val="000000"/>
+              </a:buClr>
+              <a:buSzPct val="45000"/>
+              <a:buFont typeface="Wingdings" charset="2"/>
+              <a:buChar char=""/>
+            </a:pPr>
+            <a:r>
+              <a:rPr b="0" lang="en-IN" sz="1800" spc="-1" strike="noStrike">
+                <a:latin typeface="Arial"/>
+              </a:rPr>
+              <a:t>Sixth Outline Level</a:t>
+            </a:r>
+            <a:endParaRPr b="0" lang="en-IN" sz="1800" spc="-1" strike="noStrike">
+              <a:latin typeface="Arial"/>
+            </a:endParaRPr>
+          </a:p>
+          <a:p>
+            <a:pPr lvl="6" marL="3024000" indent="-216000">
+              <a:spcBef>
+                <a:spcPts val="283"/>
+              </a:spcBef>
+              <a:buClr>
+                <a:srgbClr val="000000"/>
+              </a:buClr>
+              <a:buSzPct val="45000"/>
+              <a:buFont typeface="Wingdings" charset="2"/>
+              <a:buChar char=""/>
+            </a:pPr>
+            <a:r>
+              <a:rPr b="0" lang="en-IN" sz="1800" spc="-1" strike="noStrike">
+                <a:latin typeface="Arial"/>
+              </a:rPr>
+              <a:t>Seventh Outline Level</a:t>
+            </a:r>
+            <a:endParaRPr b="0" lang="en-IN" sz="1800" spc="-1" strike="noStrike">
+              <a:latin typeface="Arial"/>
+            </a:endParaRPr>
+          </a:p>
+        </p:txBody>
+      </p:sp>
+    </p:spTree>
+  </p:cSld>
+  <p:clrMap bg1="lt1" bg2="lt2" tx1="dk1" tx2="dk2" accent1="accent1" accent2="accent2" accent3="accent3" accent4="accent4" accent5="accent5" accent6="accent6" hlink="hlink" folHlink="folHlink"/>
+  <p:sldLayoutIdLst>
+    <p:sldLayoutId id="2147483701" r:id="rId3"/>
+    <p:sldLayoutId id="2147483702" r:id="rId4"/>
+    <p:sldLayoutId id="2147483703" r:id="rId5"/>
+    <p:sldLayoutId id="2147483704" r:id="rId6"/>
+    <p:sldLayoutId id="2147483705" r:id="rId7"/>
+    <p:sldLayoutId id="2147483706" r:id="rId8"/>
+    <p:sldLayoutId id="2147483707" r:id="rId9"/>
+    <p:sldLayoutId id="2147483708" r:id="rId10"/>
+    <p:sldLayoutId id="2147483709" r:id="rId11"/>
+    <p:sldLayoutId id="2147483710" r:id="rId12"/>
+    <p:sldLayoutId id="2147483711" r:id="rId13"/>
+    <p:sldLayoutId id="2147483712" r:id="rId14"/>
+  </p:sldLayoutIdLst>
+</p:sldMaster>
+</file>
+
+<file path=ppt/slideMasters/slideMaster6.xml><?xml version="1.0" encoding="utf-8"?>
+<p:sldMaster xmlns:a="http://schemas.openxmlformats.org/drawingml/2006/main" xmlns:p="http://schemas.openxmlformats.org/presentationml/2006/main" xmlns:r="http://schemas.openxmlformats.org/officeDocument/2006/relationships" xmlns:p14="http://schemas.microsoft.com/office/powerpoint/2010/main" xmlns:p15="http://schemas.microsoft.com/office/powerpoint/2012/main" xmlns:mc="http://schemas.openxmlformats.org/markup-compatibility/2006">
+  <p:cSld>
+    <p:bg>
+      <p:bgPr>
+        <a:blipFill rotWithShape="0">
+          <a:blip r:embed="rId2"/>
+          <a:stretch>
+            <a:fillRect/>
+          </a:stretch>
+        </a:blipFill>
+      </p:bgPr>
+    </p:bg>
+    <p:spTree>
+      <p:nvGrpSpPr>
+        <p:cNvPr id="1" name=""/>
+        <p:cNvGrpSpPr/>
+        <p:nvPr/>
+      </p:nvGrpSpPr>
+      <p:grpSpPr>
+        <a:xfrm>
+          <a:off x="0" y="0"/>
+          <a:ext cx="0" cy="0"/>
+          <a:chOff x="0" y="0"/>
+          <a:chExt cx="0" cy="0"/>
+        </a:xfrm>
+      </p:grpSpPr>
+      <p:sp>
+        <p:nvSpPr>
+          <p:cNvPr id="191" name="PlaceHolder 1"/>
+          <p:cNvSpPr>
+            <a:spLocks noGrp="1"/>
+          </p:cNvSpPr>
+          <p:nvPr>
+            <p:ph type="title"/>
+          </p:nvPr>
+        </p:nvSpPr>
+        <p:spPr>
+          <a:xfrm>
             <a:off x="504000" y="301320"/>
             <a:ext cx="9072000" cy="1261800"/>
           </a:xfrm>
@@ -8101,7 +9721,7 @@
       </p:sp>
       <p:sp>
         <p:nvSpPr>
-          <p:cNvPr id="154" name="PlaceHolder 2"/>
+          <p:cNvPr id="192" name="PlaceHolder 2"/>
           <p:cNvSpPr>
             <a:spLocks noGrp="1"/>
           </p:cNvSpPr>
@@ -8282,18 +9902,18 @@
   </p:cSld>
   <p:clrMap bg1="lt1" bg2="lt2" tx1="dk1" tx2="dk2" accent1="accent1" accent2="accent2" accent3="accent3" accent4="accent4" accent5="accent5" accent6="accent6" hlink="hlink" folHlink="folHlink"/>
   <p:sldLayoutIdLst>
-    <p:sldLayoutId id="2147483701" r:id="rId3"/>
-    <p:sldLayoutId id="2147483702" r:id="rId4"/>
-    <p:sldLayoutId id="2147483703" r:id="rId5"/>
-    <p:sldLayoutId id="2147483704" r:id="rId6"/>
-    <p:sldLayoutId id="2147483705" r:id="rId7"/>
-    <p:sldLayoutId id="2147483706" r:id="rId8"/>
-    <p:sldLayoutId id="2147483707" r:id="rId9"/>
-    <p:sldLayoutId id="2147483708" r:id="rId10"/>
-    <p:sldLayoutId id="2147483709" r:id="rId11"/>
-    <p:sldLayoutId id="2147483710" r:id="rId12"/>
-    <p:sldLayoutId id="2147483711" r:id="rId13"/>
-    <p:sldLayoutId id="2147483712" r:id="rId14"/>
+    <p:sldLayoutId id="2147483714" r:id="rId3"/>
+    <p:sldLayoutId id="2147483715" r:id="rId4"/>
+    <p:sldLayoutId id="2147483716" r:id="rId5"/>
+    <p:sldLayoutId id="2147483717" r:id="rId6"/>
+    <p:sldLayoutId id="2147483718" r:id="rId7"/>
+    <p:sldLayoutId id="2147483719" r:id="rId8"/>
+    <p:sldLayoutId id="2147483720" r:id="rId9"/>
+    <p:sldLayoutId id="2147483721" r:id="rId10"/>
+    <p:sldLayoutId id="2147483722" r:id="rId11"/>
+    <p:sldLayoutId id="2147483723" r:id="rId12"/>
+    <p:sldLayoutId id="2147483724" r:id="rId13"/>
+    <p:sldLayoutId id="2147483725" r:id="rId14"/>
   </p:sldLayoutIdLst>
 </p:sldMaster>
 </file>
@@ -8317,14 +9937,14 @@
       </p:grpSpPr>
       <p:sp>
         <p:nvSpPr>
-          <p:cNvPr id="191" name="CustomShape 1"/>
+          <p:cNvPr id="229" name="CustomShape 1"/>
           <p:cNvSpPr/>
           <p:nvPr/>
         </p:nvSpPr>
         <p:spPr>
           <a:xfrm>
             <a:off x="504000" y="1496880"/>
-            <a:ext cx="9071280" cy="893520"/>
+            <a:ext cx="9070920" cy="893160"/>
           </a:xfrm>
           <a:prstGeom prst="rect">
             <a:avLst/>
@@ -8356,6 +9976,7 @@
                   <a:srgbClr val="c9211e"/>
                 </a:solidFill>
                 <a:latin typeface="Arial"/>
+                <a:ea typeface="DejaVu Sans"/>
               </a:rPr>
               <a:t>Machines and Sentiments</a:t>
             </a:r>
@@ -8367,14 +9988,14 @@
       </p:sp>
       <p:sp>
         <p:nvSpPr>
-          <p:cNvPr id="192" name="CustomShape 2"/>
+          <p:cNvPr id="230" name="CustomShape 2"/>
           <p:cNvSpPr/>
           <p:nvPr/>
         </p:nvSpPr>
         <p:spPr>
           <a:xfrm>
             <a:off x="504000" y="3168000"/>
-            <a:ext cx="9071280" cy="3671640"/>
+            <a:ext cx="9070920" cy="3671280"/>
           </a:xfrm>
           <a:prstGeom prst="rect">
             <a:avLst/>
@@ -8393,7 +10014,7 @@
       </p:sp>
       <p:pic>
         <p:nvPicPr>
-          <p:cNvPr id="193" name="" descr=""/>
+          <p:cNvPr id="231" name="" descr=""/>
           <p:cNvPicPr/>
           <p:nvPr/>
         </p:nvPicPr>
@@ -8404,7 +10025,7 @@
         <p:spPr>
           <a:xfrm>
             <a:off x="144000" y="3611160"/>
-            <a:ext cx="10079280" cy="2508480"/>
+            <a:ext cx="10078920" cy="2508120"/>
           </a:xfrm>
           <a:prstGeom prst="rect">
             <a:avLst/>
@@ -8446,14 +10067,14 @@
       </p:grpSpPr>
       <p:sp>
         <p:nvSpPr>
-          <p:cNvPr id="209" name="CustomShape 1"/>
+          <p:cNvPr id="247" name="CustomShape 1"/>
           <p:cNvSpPr/>
           <p:nvPr/>
         </p:nvSpPr>
         <p:spPr>
           <a:xfrm>
             <a:off x="504000" y="1769040"/>
-            <a:ext cx="9071280" cy="4384080"/>
+            <a:ext cx="9070920" cy="4383720"/>
           </a:xfrm>
           <a:prstGeom prst="rect">
             <a:avLst/>
@@ -8472,7 +10093,7 @@
       </p:sp>
       <p:pic>
         <p:nvPicPr>
-          <p:cNvPr id="210" name="" descr=""/>
+          <p:cNvPr id="248" name="" descr=""/>
           <p:cNvPicPr/>
           <p:nvPr/>
         </p:nvPicPr>
@@ -8483,7 +10104,7 @@
         <p:spPr>
           <a:xfrm>
             <a:off x="1892160" y="1944000"/>
-            <a:ext cx="6315840" cy="3671640"/>
+            <a:ext cx="6315480" cy="3671280"/>
           </a:xfrm>
           <a:prstGeom prst="rect">
             <a:avLst/>
@@ -8498,14 +10119,14 @@
       </p:pic>
       <p:sp>
         <p:nvSpPr>
-          <p:cNvPr id="211" name="TextShape 2"/>
-          <p:cNvSpPr txBox="1"/>
+          <p:cNvPr id="249" name="CustomShape 2"/>
+          <p:cNvSpPr/>
           <p:nvPr/>
         </p:nvSpPr>
         <p:spPr>
           <a:xfrm>
-            <a:off x="432000" y="393840"/>
-            <a:ext cx="9071280" cy="1262160"/>
+            <a:off x="432000" y="689040"/>
+            <a:ext cx="9070920" cy="671040"/>
           </a:xfrm>
           <a:prstGeom prst="rect">
             <a:avLst/>
@@ -8515,12 +10136,22 @@
             <a:noFill/>
           </a:ln>
         </p:spPr>
+        <p:style>
+          <a:lnRef idx="0"/>
+          <a:fillRef idx="0"/>
+          <a:effectRef idx="0"/>
+          <a:fontRef idx="minor"/>
+        </p:style>
         <p:txBody>
           <a:bodyPr lIns="0" rIns="0" tIns="0" bIns="0" anchor="ctr">
             <a:spAutoFit/>
           </a:bodyPr>
           <a:p>
-            <a:pPr algn="ctr"/>
+            <a:pPr algn="ctr">
+              <a:lnSpc>
+                <a:spcPct val="100000"/>
+              </a:lnSpc>
+            </a:pPr>
             <a:r>
               <a:rPr b="0" lang="en-IN" sz="4400" spc="-1" strike="noStrike">
                 <a:latin typeface="Arial"/>
@@ -8565,14 +10196,14 @@
       </p:grpSpPr>
       <p:sp>
         <p:nvSpPr>
-          <p:cNvPr id="212" name="CustomShape 1"/>
+          <p:cNvPr id="250" name="CustomShape 1"/>
           <p:cNvSpPr/>
           <p:nvPr/>
         </p:nvSpPr>
         <p:spPr>
           <a:xfrm>
             <a:off x="504000" y="1769040"/>
-            <a:ext cx="9071280" cy="4384080"/>
+            <a:ext cx="9070920" cy="4383720"/>
           </a:xfrm>
           <a:prstGeom prst="rect">
             <a:avLst/>
@@ -8591,14 +10222,14 @@
       </p:sp>
       <p:sp>
         <p:nvSpPr>
-          <p:cNvPr id="213" name="TextShape 2"/>
-          <p:cNvSpPr txBox="1"/>
+          <p:cNvPr id="251" name="CustomShape 2"/>
+          <p:cNvSpPr/>
           <p:nvPr/>
         </p:nvSpPr>
         <p:spPr>
           <a:xfrm>
-            <a:off x="504720" y="321840"/>
-            <a:ext cx="9071280" cy="1262160"/>
+            <a:off x="504720" y="617040"/>
+            <a:ext cx="9070920" cy="671040"/>
           </a:xfrm>
           <a:prstGeom prst="rect">
             <a:avLst/>
@@ -8608,12 +10239,22 @@
             <a:noFill/>
           </a:ln>
         </p:spPr>
+        <p:style>
+          <a:lnRef idx="0"/>
+          <a:fillRef idx="0"/>
+          <a:effectRef idx="0"/>
+          <a:fontRef idx="minor"/>
+        </p:style>
         <p:txBody>
           <a:bodyPr lIns="0" rIns="0" tIns="0" bIns="0" anchor="ctr">
             <a:spAutoFit/>
           </a:bodyPr>
           <a:p>
-            <a:pPr algn="ctr"/>
+            <a:pPr algn="ctr">
+              <a:lnSpc>
+                <a:spcPct val="100000"/>
+              </a:lnSpc>
+            </a:pPr>
             <a:r>
               <a:rPr b="0" lang="en-IN" sz="4400" spc="-1" strike="noStrike">
                 <a:latin typeface="Arial"/>
@@ -8628,7 +10269,7 @@
       </p:sp>
       <p:pic>
         <p:nvPicPr>
-          <p:cNvPr id="214" name="" descr=""/>
+          <p:cNvPr id="252" name="" descr=""/>
           <p:cNvPicPr/>
           <p:nvPr/>
         </p:nvPicPr>
@@ -8639,7 +10280,7 @@
         <p:spPr>
           <a:xfrm>
             <a:off x="1872000" y="1944360"/>
-            <a:ext cx="6306480" cy="3671640"/>
+            <a:ext cx="6306120" cy="3671280"/>
           </a:xfrm>
           <a:prstGeom prst="rect">
             <a:avLst/>
@@ -8684,14 +10325,14 @@
       </p:grpSpPr>
       <p:sp>
         <p:nvSpPr>
-          <p:cNvPr id="215" name="CustomShape 1"/>
+          <p:cNvPr id="253" name="CustomShape 1"/>
           <p:cNvSpPr/>
           <p:nvPr/>
         </p:nvSpPr>
         <p:spPr>
           <a:xfrm>
             <a:off x="504000" y="1769040"/>
-            <a:ext cx="9071280" cy="4384080"/>
+            <a:ext cx="9070920" cy="4383720"/>
           </a:xfrm>
           <a:prstGeom prst="rect">
             <a:avLst/>
@@ -8710,14 +10351,14 @@
       </p:sp>
       <p:sp>
         <p:nvSpPr>
-          <p:cNvPr id="216" name="TextShape 2"/>
-          <p:cNvSpPr txBox="1"/>
+          <p:cNvPr id="254" name="CustomShape 2"/>
+          <p:cNvSpPr/>
           <p:nvPr/>
         </p:nvSpPr>
         <p:spPr>
           <a:xfrm>
-            <a:off x="432000" y="352080"/>
-            <a:ext cx="9071280" cy="1262160"/>
+            <a:off x="432000" y="647280"/>
+            <a:ext cx="9070920" cy="671040"/>
           </a:xfrm>
           <a:prstGeom prst="rect">
             <a:avLst/>
@@ -8727,12 +10368,22 @@
             <a:noFill/>
           </a:ln>
         </p:spPr>
+        <p:style>
+          <a:lnRef idx="0"/>
+          <a:fillRef idx="0"/>
+          <a:effectRef idx="0"/>
+          <a:fontRef idx="minor"/>
+        </p:style>
         <p:txBody>
           <a:bodyPr lIns="0" rIns="0" tIns="0" bIns="0" anchor="ctr">
             <a:spAutoFit/>
           </a:bodyPr>
           <a:p>
-            <a:pPr algn="ctr"/>
+            <a:pPr algn="ctr">
+              <a:lnSpc>
+                <a:spcPct val="100000"/>
+              </a:lnSpc>
+            </a:pPr>
             <a:r>
               <a:rPr b="0" lang="en-IN" sz="4400" spc="-1" strike="noStrike">
                 <a:latin typeface="Arial"/>
@@ -8747,7 +10398,7 @@
       </p:sp>
       <p:pic>
         <p:nvPicPr>
-          <p:cNvPr id="217" name="" descr=""/>
+          <p:cNvPr id="255" name="" descr=""/>
           <p:cNvPicPr/>
           <p:nvPr/>
         </p:nvPicPr>
@@ -8758,7 +10409,7 @@
         <p:spPr>
           <a:xfrm>
             <a:off x="1870560" y="1872000"/>
-            <a:ext cx="6337440" cy="3671640"/>
+            <a:ext cx="6337080" cy="3671280"/>
           </a:xfrm>
           <a:prstGeom prst="rect">
             <a:avLst/>
@@ -8803,14 +10454,14 @@
       </p:grpSpPr>
       <p:sp>
         <p:nvSpPr>
-          <p:cNvPr id="218" name="CustomShape 1"/>
+          <p:cNvPr id="256" name="CustomShape 1"/>
           <p:cNvSpPr/>
           <p:nvPr/>
         </p:nvSpPr>
         <p:spPr>
           <a:xfrm>
             <a:off x="2376000" y="3129120"/>
-            <a:ext cx="7199280" cy="1339920"/>
+            <a:ext cx="7198920" cy="1339920"/>
           </a:xfrm>
           <a:prstGeom prst="rect">
             <a:avLst/>
@@ -8842,6 +10493,7 @@
                   <a:srgbClr val="ffffff"/>
                 </a:solidFill>
                 <a:latin typeface="Arial"/>
+                <a:ea typeface="DejaVu Sans"/>
               </a:rPr>
               <a:t>Done By:</a:t>
             </a:r>
@@ -8852,6 +10504,7 @@
                   <a:srgbClr val="ffffff"/>
                 </a:solidFill>
                 <a:latin typeface="Arial"/>
+                <a:ea typeface="DejaVu Sans"/>
               </a:rPr>
               <a:t>Saisha Shetty</a:t>
             </a:r>
@@ -8862,6 +10515,7 @@
                   <a:srgbClr val="ffffff"/>
                 </a:solidFill>
                 <a:latin typeface="Arial"/>
+                <a:ea typeface="DejaVu Sans"/>
               </a:rPr>
               <a:t>Rusali Saha</a:t>
             </a:r>
@@ -8872,6 +10526,7 @@
                   <a:srgbClr val="ffffff"/>
                 </a:solidFill>
                 <a:latin typeface="Arial"/>
+                <a:ea typeface="DejaVu Sans"/>
               </a:rPr>
               <a:t>Pranav B Kashyap</a:t>
             </a:r>
@@ -8883,7 +10538,7 @@
       </p:sp>
       <p:pic>
         <p:nvPicPr>
-          <p:cNvPr id="219" name="" descr=""/>
+          <p:cNvPr id="257" name="" descr=""/>
           <p:cNvPicPr/>
           <p:nvPr/>
         </p:nvPicPr>
@@ -8894,7 +10549,7 @@
         <p:spPr>
           <a:xfrm>
             <a:off x="816120" y="3621600"/>
-            <a:ext cx="1271520" cy="447120"/>
+            <a:ext cx="1271160" cy="446760"/>
           </a:xfrm>
           <a:prstGeom prst="rect">
             <a:avLst/>
@@ -8936,14 +10591,14 @@
       </p:grpSpPr>
       <p:sp>
         <p:nvSpPr>
-          <p:cNvPr id="194" name="CustomShape 1"/>
+          <p:cNvPr id="232" name="CustomShape 1"/>
           <p:cNvSpPr/>
           <p:nvPr/>
         </p:nvSpPr>
         <p:spPr>
           <a:xfrm>
             <a:off x="504000" y="4664880"/>
-            <a:ext cx="9071280" cy="893520"/>
+            <a:ext cx="9070920" cy="893160"/>
           </a:xfrm>
           <a:prstGeom prst="rect">
             <a:avLst/>
@@ -8975,6 +10630,7 @@
                   <a:srgbClr val="c9211e"/>
                 </a:solidFill>
                 <a:latin typeface="Arial"/>
+                <a:ea typeface="DejaVu Sans"/>
               </a:rPr>
               <a:t>Introduction</a:t>
             </a:r>
@@ -9016,14 +10672,14 @@
       </p:grpSpPr>
       <p:sp>
         <p:nvSpPr>
-          <p:cNvPr id="195" name="CustomShape 1"/>
+          <p:cNvPr id="233" name="CustomShape 1"/>
           <p:cNvSpPr/>
           <p:nvPr/>
         </p:nvSpPr>
         <p:spPr>
           <a:xfrm>
             <a:off x="504000" y="596520"/>
-            <a:ext cx="9071280" cy="671040"/>
+            <a:ext cx="9070920" cy="670680"/>
           </a:xfrm>
           <a:prstGeom prst="rect">
             <a:avLst/>
@@ -9051,7 +10707,11 @@
             </a:pPr>
             <a:r>
               <a:rPr b="0" lang="en-IN" sz="4400" spc="-1" strike="noStrike">
+                <a:solidFill>
+                  <a:srgbClr val="000000"/>
+                </a:solidFill>
                 <a:latin typeface="Arial"/>
+                <a:ea typeface="DejaVu Sans"/>
               </a:rPr>
               <a:t>Why Natural Language Processing?</a:t>
             </a:r>
@@ -9063,14 +10723,14 @@
       </p:sp>
       <p:sp>
         <p:nvSpPr>
-          <p:cNvPr id="196" name="CustomShape 2"/>
+          <p:cNvPr id="234" name="CustomShape 2"/>
           <p:cNvSpPr/>
           <p:nvPr/>
         </p:nvSpPr>
         <p:spPr>
           <a:xfrm>
             <a:off x="504000" y="1769040"/>
-            <a:ext cx="9071280" cy="4384080"/>
+            <a:ext cx="9070920" cy="4383720"/>
           </a:xfrm>
           <a:prstGeom prst="rect">
             <a:avLst/>
@@ -9088,10 +10748,10 @@
         </p:style>
         <p:txBody>
           <a:bodyPr lIns="0" rIns="0" tIns="0" bIns="0">
-            <a:normAutofit fontScale="61000"/>
-          </a:bodyPr>
-          <a:p>
-            <a:pPr marL="432000" indent="-323640">
+            <a:normAutofit fontScale="78000"/>
+          </a:bodyPr>
+          <a:p>
+            <a:pPr marL="432000" indent="-323280">
               <a:lnSpc>
                 <a:spcPct val="100000"/>
               </a:lnSpc>
@@ -9107,16 +10767,20 @@
             </a:pPr>
             <a:r>
               <a:rPr b="0" lang="en-IN" sz="3200" spc="-1" strike="noStrike">
+                <a:solidFill>
+                  <a:srgbClr val="000000"/>
+                </a:solidFill>
                 <a:latin typeface="Arial"/>
+                <a:ea typeface="DejaVu Sans"/>
               </a:rPr>
-              <a:t>Human Beings are considered as one of the most advanced and successfull species in the world due to their ability to communicate. </a:t>
+              <a:t>Human Beings are considered as one of the most advanced and successful species in the world due to their ability to communicate. </a:t>
             </a:r>
             <a:endParaRPr b="0" lang="en-IN" sz="3200" spc="-1" strike="noStrike">
               <a:latin typeface="Arial"/>
             </a:endParaRPr>
           </a:p>
           <a:p>
-            <a:pPr marL="432000" indent="-323640">
+            <a:pPr marL="432000" indent="-323280">
               <a:lnSpc>
                 <a:spcPct val="100000"/>
               </a:lnSpc>
@@ -9132,7 +10796,11 @@
             </a:pPr>
             <a:r>
               <a:rPr b="0" lang="en-IN" sz="3200" spc="-1" strike="noStrike">
+                <a:solidFill>
+                  <a:srgbClr val="000000"/>
+                </a:solidFill>
                 <a:latin typeface="Arial"/>
+                <a:ea typeface="DejaVu Sans"/>
               </a:rPr>
               <a:t>This is where the concept of Language comes into the picture, which is nothing but a medium for communication.</a:t>
             </a:r>
@@ -9141,7 +10809,7 @@
             </a:endParaRPr>
           </a:p>
           <a:p>
-            <a:pPr marL="432000" indent="-323640">
+            <a:pPr marL="432000" indent="-323280">
               <a:lnSpc>
                 <a:spcPct val="100000"/>
               </a:lnSpc>
@@ -9157,16 +10825,20 @@
             </a:pPr>
             <a:r>
               <a:rPr b="0" lang="en-IN" sz="3200" spc="-1" strike="noStrike">
+                <a:solidFill>
+                  <a:srgbClr val="000000"/>
+                </a:solidFill>
                 <a:latin typeface="Arial"/>
+                <a:ea typeface="DejaVu Sans"/>
               </a:rPr>
-              <a:t>So, we have covered the process of communicating with other fellow humans. What about machines? Is it possible to Communicate with the machines in a similar fashion.</a:t>
+              <a:t>What about machines? Is it possible to communicate with the machines in a similar fashion.</a:t>
             </a:r>
             <a:endParaRPr b="0" lang="en-IN" sz="3200" spc="-1" strike="noStrike">
               <a:latin typeface="Arial"/>
             </a:endParaRPr>
           </a:p>
           <a:p>
-            <a:pPr marL="432000" indent="-323640">
+            <a:pPr marL="432000" indent="-323280">
               <a:lnSpc>
                 <a:spcPct val="100000"/>
               </a:lnSpc>
@@ -9182,9 +10854,13 @@
             </a:pPr>
             <a:r>
               <a:rPr b="0" lang="en-IN" sz="3200" spc="-1" strike="noStrike">
+                <a:solidFill>
+                  <a:srgbClr val="000000"/>
+                </a:solidFill>
                 <a:latin typeface="Arial"/>
+                <a:ea typeface="DejaVu Sans"/>
               </a:rPr>
-              <a:t>Yesss! And here is where NLP comes into the Picture</a:t>
+              <a:t>Yesss! And here is where NLP comes into play.</a:t>
             </a:r>
             <a:endParaRPr b="0" lang="en-IN" sz="3200" spc="-1" strike="noStrike">
               <a:latin typeface="Arial"/>
@@ -9224,14 +10900,14 @@
       </p:grpSpPr>
       <p:sp>
         <p:nvSpPr>
-          <p:cNvPr id="197" name="CustomShape 1"/>
+          <p:cNvPr id="235" name="CustomShape 1"/>
           <p:cNvSpPr/>
           <p:nvPr/>
         </p:nvSpPr>
         <p:spPr>
           <a:xfrm>
             <a:off x="504000" y="262440"/>
-            <a:ext cx="9071280" cy="1339920"/>
+            <a:ext cx="9070920" cy="1339920"/>
           </a:xfrm>
           <a:prstGeom prst="rect">
             <a:avLst/>
@@ -9259,7 +10935,11 @@
             </a:pPr>
             <a:r>
               <a:rPr b="0" lang="en-IN" sz="4400" spc="-1" strike="noStrike">
+                <a:solidFill>
+                  <a:srgbClr val="000000"/>
+                </a:solidFill>
                 <a:latin typeface="Arial"/>
+                <a:ea typeface="DejaVu Sans"/>
               </a:rPr>
               <a:t>What is Natural Language Processing?</a:t>
             </a:r>
@@ -9271,7 +10951,7 @@
       </p:sp>
       <p:pic>
         <p:nvPicPr>
-          <p:cNvPr id="198" name="" descr=""/>
+          <p:cNvPr id="236" name="" descr=""/>
           <p:cNvPicPr/>
           <p:nvPr/>
         </p:nvPicPr>
@@ -9282,7 +10962,7 @@
         <p:spPr>
           <a:xfrm>
             <a:off x="503640" y="2711160"/>
-            <a:ext cx="4426560" cy="2499120"/>
+            <a:ext cx="4426200" cy="2498760"/>
           </a:xfrm>
           <a:prstGeom prst="rect">
             <a:avLst/>
@@ -9294,14 +10974,14 @@
       </p:pic>
       <p:sp>
         <p:nvSpPr>
-          <p:cNvPr id="199" name="CustomShape 2"/>
+          <p:cNvPr id="237" name="CustomShape 2"/>
           <p:cNvSpPr/>
           <p:nvPr/>
         </p:nvSpPr>
         <p:spPr>
           <a:xfrm>
             <a:off x="5152680" y="1769040"/>
-            <a:ext cx="4426560" cy="4384080"/>
+            <a:ext cx="4426200" cy="4383720"/>
           </a:xfrm>
           <a:prstGeom prst="rect">
             <a:avLst/>
@@ -9322,7 +11002,7 @@
             <a:normAutofit/>
           </a:bodyPr>
           <a:p>
-            <a:pPr marL="432000" indent="-323640">
+            <a:pPr marL="432000" indent="-323280">
               <a:lnSpc>
                 <a:spcPct val="100000"/>
               </a:lnSpc>
@@ -9338,9 +11018,13 @@
             </a:pPr>
             <a:r>
               <a:rPr b="0" lang="en-IN" sz="3200" spc="-1" strike="noStrike">
+                <a:solidFill>
+                  <a:srgbClr val="000000"/>
+                </a:solidFill>
                 <a:latin typeface="Arial"/>
+                <a:ea typeface="DejaVu Sans"/>
               </a:rPr>
-              <a:t>NLP is the process through which the computer/ machine tries to understand and implement the Human language using Large amounts of Natural Language Data.</a:t>
+              <a:t>NLP is the process through which the computer/ machine tries to understand and implement the Human language using large amounts of Natural Language Data.</a:t>
             </a:r>
             <a:endParaRPr b="0" lang="en-IN" sz="3200" spc="-1" strike="noStrike">
               <a:latin typeface="Arial"/>
@@ -9380,14 +11064,14 @@
       </p:grpSpPr>
       <p:sp>
         <p:nvSpPr>
-          <p:cNvPr id="200" name="CustomShape 1"/>
+          <p:cNvPr id="238" name="CustomShape 1"/>
           <p:cNvSpPr/>
           <p:nvPr/>
         </p:nvSpPr>
         <p:spPr>
           <a:xfrm>
             <a:off x="504000" y="596520"/>
-            <a:ext cx="9071280" cy="671040"/>
+            <a:ext cx="9070920" cy="670680"/>
           </a:xfrm>
           <a:prstGeom prst="rect">
             <a:avLst/>
@@ -9415,7 +11099,11 @@
             </a:pPr>
             <a:r>
               <a:rPr b="0" lang="en-IN" sz="4400" spc="-1" strike="noStrike">
+                <a:solidFill>
+                  <a:srgbClr val="000000"/>
+                </a:solidFill>
                 <a:latin typeface="Arial"/>
+                <a:ea typeface="DejaVu Sans"/>
               </a:rPr>
               <a:t>What is Sentimental Analysis?</a:t>
             </a:r>
@@ -9427,14 +11115,14 @@
       </p:sp>
       <p:sp>
         <p:nvSpPr>
-          <p:cNvPr id="201" name="CustomShape 2"/>
+          <p:cNvPr id="239" name="CustomShape 2"/>
           <p:cNvSpPr/>
           <p:nvPr/>
         </p:nvSpPr>
         <p:spPr>
           <a:xfrm>
             <a:off x="504000" y="1769040"/>
-            <a:ext cx="9071280" cy="4384080"/>
+            <a:ext cx="9070920" cy="4383720"/>
           </a:xfrm>
           <a:prstGeom prst="rect">
             <a:avLst/>
@@ -9455,7 +11143,7 @@
             <a:normAutofit fontScale="83000"/>
           </a:bodyPr>
           <a:p>
-            <a:pPr marL="432000" indent="-323640">
+            <a:pPr marL="432000" indent="-323280">
               <a:lnSpc>
                 <a:spcPct val="100000"/>
               </a:lnSpc>
@@ -9471,7 +11159,11 @@
             </a:pPr>
             <a:r>
               <a:rPr b="0" lang="en-IN" sz="3200" spc="-1" strike="noStrike">
+                <a:solidFill>
+                  <a:srgbClr val="000000"/>
+                </a:solidFill>
                 <a:latin typeface="Arial"/>
+                <a:ea typeface="DejaVu Sans"/>
               </a:rPr>
               <a:t>As the world progresses exponentially in terms of technological advancements, one of the most essential things which needs to be given importance is Human Sentiments.</a:t>
             </a:r>
@@ -9480,7 +11172,7 @@
             </a:endParaRPr>
           </a:p>
           <a:p>
-            <a:pPr marL="432000" indent="-323640">
+            <a:pPr marL="432000" indent="-323280">
               <a:lnSpc>
                 <a:spcPct val="100000"/>
               </a:lnSpc>
@@ -9496,16 +11188,20 @@
             </a:pPr>
             <a:r>
               <a:rPr b="0" lang="en-IN" sz="3200" spc="-1" strike="noStrike">
+                <a:solidFill>
+                  <a:srgbClr val="000000"/>
+                </a:solidFill>
                 <a:latin typeface="Arial"/>
+                <a:ea typeface="DejaVu Sans"/>
               </a:rPr>
-              <a:t>Here is where the concept of Sentimental Analysis comes into play where machines identify the underlying sentiments or subjective informaition from the text data which is given.</a:t>
+              <a:t>Here is where the concept of Sentimental Analysis comes into play where machines identify the underlying sentiments or subjective information from the given text data.</a:t>
             </a:r>
             <a:endParaRPr b="0" lang="en-IN" sz="3200" spc="-1" strike="noStrike">
               <a:latin typeface="Arial"/>
             </a:endParaRPr>
           </a:p>
           <a:p>
-            <a:pPr marL="432000" indent="-323640">
+            <a:pPr marL="432000" indent="-323280">
               <a:lnSpc>
                 <a:spcPct val="100000"/>
               </a:lnSpc>
@@ -9521,7 +11217,11 @@
             </a:pPr>
             <a:r>
               <a:rPr b="0" lang="en-IN" sz="3200" spc="-1" strike="noStrike">
+                <a:solidFill>
+                  <a:srgbClr val="000000"/>
+                </a:solidFill>
                 <a:latin typeface="Arial"/>
+                <a:ea typeface="DejaVu Sans"/>
               </a:rPr>
               <a:t>Sentimental Analysis is also referred to as Opinion Mining. It is a subset of NLP.</a:t>
             </a:r>
@@ -9563,14 +11263,14 @@
       </p:grpSpPr>
       <p:sp>
         <p:nvSpPr>
-          <p:cNvPr id="202" name="CustomShape 1"/>
+          <p:cNvPr id="240" name="CustomShape 1"/>
           <p:cNvSpPr/>
           <p:nvPr/>
         </p:nvSpPr>
         <p:spPr>
           <a:xfrm>
             <a:off x="504000" y="4664880"/>
-            <a:ext cx="9071280" cy="893520"/>
+            <a:ext cx="9070920" cy="893160"/>
           </a:xfrm>
           <a:prstGeom prst="rect">
             <a:avLst/>
@@ -9602,6 +11302,7 @@
                   <a:srgbClr val="c9211e"/>
                 </a:solidFill>
                 <a:latin typeface="Arial"/>
+                <a:ea typeface="DejaVu Sans"/>
               </a:rPr>
               <a:t>Our Project</a:t>
             </a:r>
@@ -9643,14 +11344,14 @@
       </p:grpSpPr>
       <p:sp>
         <p:nvSpPr>
-          <p:cNvPr id="203" name="CustomShape 1"/>
+          <p:cNvPr id="241" name="CustomShape 1"/>
           <p:cNvSpPr/>
           <p:nvPr/>
         </p:nvSpPr>
         <p:spPr>
           <a:xfrm>
             <a:off x="504000" y="596520"/>
-            <a:ext cx="9071280" cy="671040"/>
+            <a:ext cx="9070920" cy="670680"/>
           </a:xfrm>
           <a:prstGeom prst="rect">
             <a:avLst/>
@@ -9678,7 +11379,11 @@
             </a:pPr>
             <a:r>
               <a:rPr b="0" lang="en-IN" sz="4400" spc="-1" strike="noStrike">
+                <a:solidFill>
+                  <a:srgbClr val="000000"/>
+                </a:solidFill>
                 <a:latin typeface="Arial"/>
+                <a:ea typeface="DejaVu Sans"/>
               </a:rPr>
               <a:t>Project Idea</a:t>
             </a:r>
@@ -9690,14 +11395,14 @@
       </p:sp>
       <p:sp>
         <p:nvSpPr>
-          <p:cNvPr id="204" name="CustomShape 2"/>
+          <p:cNvPr id="242" name="CustomShape 2"/>
           <p:cNvSpPr/>
           <p:nvPr/>
         </p:nvSpPr>
         <p:spPr>
           <a:xfrm>
             <a:off x="504000" y="1769040"/>
-            <a:ext cx="4426560" cy="4384080"/>
+            <a:ext cx="4426200" cy="4383720"/>
           </a:xfrm>
           <a:prstGeom prst="rect">
             <a:avLst/>
@@ -9715,10 +11420,10 @@
         </p:style>
         <p:txBody>
           <a:bodyPr lIns="0" rIns="0" tIns="0" bIns="0">
-            <a:normAutofit fontScale="67000"/>
-          </a:bodyPr>
-          <a:p>
-            <a:pPr marL="432000" indent="-323640">
+            <a:normAutofit fontScale="60000"/>
+          </a:bodyPr>
+          <a:p>
+            <a:pPr marL="432000" indent="-323280">
               <a:lnSpc>
                 <a:spcPct val="100000"/>
               </a:lnSpc>
@@ -9734,7 +11439,11 @@
             </a:pPr>
             <a:r>
               <a:rPr b="0" lang="en-IN" sz="3200" spc="-1" strike="noStrike">
+                <a:solidFill>
+                  <a:srgbClr val="000000"/>
+                </a:solidFill>
                 <a:latin typeface="Arial"/>
+                <a:ea typeface="DejaVu Sans"/>
               </a:rPr>
               <a:t>COVID-19 and Lockdown has pushed up internet usage by a whopping 70% and Online Streaming by 12%.</a:t>
             </a:r>
@@ -9743,7 +11452,7 @@
             </a:endParaRPr>
           </a:p>
           <a:p>
-            <a:pPr marL="432000" indent="-323640">
+            <a:pPr marL="432000" indent="-323280">
               <a:lnSpc>
                 <a:spcPct val="100000"/>
               </a:lnSpc>
@@ -9759,9 +11468,13 @@
             </a:pPr>
             <a:r>
               <a:rPr b="0" lang="en-IN" sz="3200" spc="-1" strike="noStrike">
+                <a:solidFill>
+                  <a:srgbClr val="000000"/>
+                </a:solidFill>
                 <a:latin typeface="Arial"/>
+                <a:ea typeface="DejaVu Sans"/>
               </a:rPr>
-              <a:t>To help and guide the people, we have built a simple Movie Recommender System and Movie Review Analyser.</a:t>
+              <a:t>We have built a simple Movie Recommender System and Movie Review Analyser, to help and guide the people.</a:t>
             </a:r>
             <a:endParaRPr b="0" lang="en-IN" sz="3200" spc="-1" strike="noStrike">
               <a:latin typeface="Arial"/>
@@ -9771,7 +11484,7 @@
       </p:sp>
       <p:pic>
         <p:nvPicPr>
-          <p:cNvPr id="205" name="" descr=""/>
+          <p:cNvPr id="243" name="" descr=""/>
           <p:cNvPicPr/>
           <p:nvPr/>
         </p:nvPicPr>
@@ -9782,7 +11495,7 @@
         <p:spPr>
           <a:xfrm>
             <a:off x="5152320" y="2224080"/>
-            <a:ext cx="4426560" cy="3473280"/>
+            <a:ext cx="4426200" cy="3472920"/>
           </a:xfrm>
           <a:prstGeom prst="rect">
             <a:avLst/>
@@ -9827,14 +11540,14 @@
       </p:grpSpPr>
       <p:sp>
         <p:nvSpPr>
-          <p:cNvPr id="206" name="CustomShape 1"/>
+          <p:cNvPr id="244" name="CustomShape 1"/>
           <p:cNvSpPr/>
           <p:nvPr/>
         </p:nvSpPr>
         <p:spPr>
           <a:xfrm>
             <a:off x="504000" y="596520"/>
-            <a:ext cx="9071280" cy="671040"/>
+            <a:ext cx="9070920" cy="670680"/>
           </a:xfrm>
           <a:prstGeom prst="rect">
             <a:avLst/>
@@ -9862,7 +11575,11 @@
             </a:pPr>
             <a:r>
               <a:rPr b="0" lang="en-IN" sz="4400" spc="-1" strike="noStrike">
+                <a:solidFill>
+                  <a:srgbClr val="000000"/>
+                </a:solidFill>
                 <a:latin typeface="Arial"/>
+                <a:ea typeface="DejaVu Sans"/>
               </a:rPr>
               <a:t>Project Concept</a:t>
             </a:r>
@@ -9874,14 +11591,14 @@
       </p:sp>
       <p:sp>
         <p:nvSpPr>
-          <p:cNvPr id="207" name="CustomShape 2"/>
+          <p:cNvPr id="245" name="CustomShape 2"/>
           <p:cNvSpPr/>
           <p:nvPr/>
         </p:nvSpPr>
         <p:spPr>
           <a:xfrm>
             <a:off x="504000" y="1769040"/>
-            <a:ext cx="9071280" cy="4384080"/>
+            <a:ext cx="9070920" cy="4383720"/>
           </a:xfrm>
           <a:prstGeom prst="rect">
             <a:avLst/>
@@ -9902,7 +11619,7 @@
             <a:normAutofit fontScale="78000"/>
           </a:bodyPr>
           <a:p>
-            <a:pPr marL="432000" indent="-323640">
+            <a:pPr marL="432000" indent="-323280">
               <a:lnSpc>
                 <a:spcPct val="100000"/>
               </a:lnSpc>
@@ -9918,7 +11635,11 @@
             </a:pPr>
             <a:r>
               <a:rPr b="0" lang="en-IN" sz="3200" spc="-1" strike="noStrike">
+                <a:solidFill>
+                  <a:srgbClr val="000000"/>
+                </a:solidFill>
                 <a:latin typeface="Arial"/>
+                <a:ea typeface="DejaVu Sans"/>
               </a:rPr>
               <a:t>We have divided the concept into 3 parts:</a:t>
             </a:r>
@@ -9927,7 +11648,7 @@
             </a:endParaRPr>
           </a:p>
           <a:p>
-            <a:pPr lvl="1" marL="864000" indent="-323640">
+            <a:pPr lvl="1" marL="864000" indent="-323280">
               <a:lnSpc>
                 <a:spcPct val="100000"/>
               </a:lnSpc>
@@ -9943,7 +11664,11 @@
             </a:pPr>
             <a:r>
               <a:rPr b="0" lang="en-IN" sz="2800" spc="-1" strike="noStrike">
+                <a:solidFill>
+                  <a:srgbClr val="000000"/>
+                </a:solidFill>
                 <a:latin typeface="Arial"/>
+                <a:ea typeface="DejaVu Sans"/>
               </a:rPr>
               <a:t>Review Analyser:</a:t>
             </a:r>
@@ -9952,7 +11677,7 @@
             </a:endParaRPr>
           </a:p>
           <a:p>
-            <a:pPr lvl="2" marL="1296000" indent="-287640">
+            <a:pPr lvl="2" marL="1296000" indent="-287280">
               <a:lnSpc>
                 <a:spcPct val="100000"/>
               </a:lnSpc>
@@ -9968,7 +11693,11 @@
             </a:pPr>
             <a:r>
               <a:rPr b="0" lang="en-IN" sz="2400" spc="-1" strike="noStrike">
+                <a:solidFill>
+                  <a:srgbClr val="000000"/>
+                </a:solidFill>
                 <a:latin typeface="Arial"/>
+                <a:ea typeface="DejaVu Sans"/>
               </a:rPr>
               <a:t>Analyse and Predict the emotion and nature of a user review using Sentiment Analysis</a:t>
             </a:r>
@@ -9977,7 +11706,7 @@
             </a:endParaRPr>
           </a:p>
           <a:p>
-            <a:pPr lvl="1" marL="864000" indent="-323640">
+            <a:pPr lvl="1" marL="864000" indent="-323280">
               <a:lnSpc>
                 <a:spcPct val="100000"/>
               </a:lnSpc>
@@ -9993,7 +11722,11 @@
             </a:pPr>
             <a:r>
               <a:rPr b="0" lang="en-IN" sz="2800" spc="-1" strike="noStrike">
+                <a:solidFill>
+                  <a:srgbClr val="000000"/>
+                </a:solidFill>
                 <a:latin typeface="Arial"/>
+                <a:ea typeface="DejaVu Sans"/>
               </a:rPr>
               <a:t>Movie Recommender System</a:t>
             </a:r>
@@ -10002,7 +11735,7 @@
             </a:endParaRPr>
           </a:p>
           <a:p>
-            <a:pPr lvl="2" marL="1296000" indent="-287640">
+            <a:pPr lvl="2" marL="1296000" indent="-287280">
               <a:lnSpc>
                 <a:spcPct val="100000"/>
               </a:lnSpc>
@@ -10018,7 +11751,11 @@
             </a:pPr>
             <a:r>
               <a:rPr b="0" lang="en-IN" sz="2400" spc="-1" strike="noStrike">
+                <a:solidFill>
+                  <a:srgbClr val="000000"/>
+                </a:solidFill>
                 <a:latin typeface="Arial"/>
+                <a:ea typeface="DejaVu Sans"/>
               </a:rPr>
               <a:t>Recommend a set of Movies based on the Movie which the user inputs.</a:t>
             </a:r>
@@ -10027,7 +11764,7 @@
             </a:endParaRPr>
           </a:p>
           <a:p>
-            <a:pPr lvl="1" marL="864000" indent="-323640">
+            <a:pPr lvl="1" marL="864000" indent="-323280">
               <a:lnSpc>
                 <a:spcPct val="100000"/>
               </a:lnSpc>
@@ -10043,7 +11780,11 @@
             </a:pPr>
             <a:r>
               <a:rPr b="0" lang="en-IN" sz="2800" spc="-1" strike="noStrike">
+                <a:solidFill>
+                  <a:srgbClr val="000000"/>
+                </a:solidFill>
                 <a:latin typeface="Arial"/>
+                <a:ea typeface="DejaVu Sans"/>
               </a:rPr>
               <a:t>ROBO</a:t>
             </a:r>
@@ -10052,7 +11793,7 @@
             </a:endParaRPr>
           </a:p>
           <a:p>
-            <a:pPr lvl="2" marL="1296000" indent="-287640">
+            <a:pPr lvl="2" marL="1296000" indent="-287280">
               <a:lnSpc>
                 <a:spcPct val="100000"/>
               </a:lnSpc>
@@ -10068,9 +11809,13 @@
             </a:pPr>
             <a:r>
               <a:rPr b="0" lang="en-IN" sz="2400" spc="-1" strike="noStrike">
+                <a:solidFill>
+                  <a:srgbClr val="000000"/>
+                </a:solidFill>
                 <a:latin typeface="Arial"/>
+                <a:ea typeface="DejaVu Sans"/>
               </a:rPr>
-              <a:t>Our very own chatobot which is like the glue of our projects. It not only helps in assisting the user but also integrate both the recommender and review analyser together</a:t>
+              <a:t>Our very own chat-bot which is like the glue of our projects. It not only helps in assisting the user but also integrate both the recommender and review analyser together.</a:t>
             </a:r>
             <a:endParaRPr b="0" lang="en-IN" sz="2400" spc="-1" strike="noStrike">
               <a:latin typeface="Arial"/>
@@ -10110,14 +11855,14 @@
       </p:grpSpPr>
       <p:sp>
         <p:nvSpPr>
-          <p:cNvPr id="208" name="CustomShape 1"/>
+          <p:cNvPr id="246" name="CustomShape 1"/>
           <p:cNvSpPr/>
           <p:nvPr/>
         </p:nvSpPr>
         <p:spPr>
           <a:xfrm>
             <a:off x="504000" y="4664880"/>
-            <a:ext cx="9071280" cy="893520"/>
+            <a:ext cx="9070920" cy="893160"/>
           </a:xfrm>
           <a:prstGeom prst="rect">
             <a:avLst/>
@@ -10149,6 +11894,7 @@
                   <a:srgbClr val="c9211e"/>
                 </a:solidFill>
                 <a:latin typeface="Arial"/>
+                <a:ea typeface="DejaVu Sans"/>
               </a:rPr>
               <a:t>Visuals of Our Project</a:t>
             </a:r>
@@ -11284,4 +13030,227 @@
     </a:fmtScheme>
   </a:themeElements>
 </a:theme>
+</file>
+
+<file path=ppt/theme/theme6.xml><?xml version="1.0" encoding="utf-8"?>
+<a:theme xmlns:a="http://schemas.openxmlformats.org/drawingml/2006/main" name="Office Theme">
+  <a:themeElements>
+    <a:clrScheme name="Office">
+      <a:dk1>
+        <a:sysClr val="windowText" lastClr="000000"/>
+      </a:dk1>
+      <a:lt1>
+        <a:sysClr val="window" lastClr="FFFFFF"/>
+      </a:lt1>
+      <a:dk2>
+        <a:srgbClr val="1f497d"/>
+      </a:dk2>
+      <a:lt2>
+        <a:srgbClr val="eeece1"/>
+      </a:lt2>
+      <a:accent1>
+        <a:srgbClr val="4f81bd"/>
+      </a:accent1>
+      <a:accent2>
+        <a:srgbClr val="c0504d"/>
+      </a:accent2>
+      <a:accent3>
+        <a:srgbClr val="9bbb59"/>
+      </a:accent3>
+      <a:accent4>
+        <a:srgbClr val="8064a2"/>
+      </a:accent4>
+      <a:accent5>
+        <a:srgbClr val="4bacc6"/>
+      </a:accent5>
+      <a:accent6>
+        <a:srgbClr val="f79646"/>
+      </a:accent6>
+      <a:hlink>
+        <a:srgbClr val="0000ff"/>
+      </a:hlink>
+      <a:folHlink>
+        <a:srgbClr val="800080"/>
+      </a:folHlink>
+    </a:clrScheme>
+    <a:fontScheme name="Office">
+      <a:majorFont>
+        <a:latin typeface="Arial"/>
+        <a:ea typeface="DejaVu Sans"/>
+        <a:cs typeface="DejaVu Sans"/>
+      </a:majorFont>
+      <a:minorFont>
+        <a:latin typeface="Arial"/>
+        <a:ea typeface="DejaVu Sans"/>
+        <a:cs typeface="DejaVu Sans"/>
+      </a:minorFont>
+    </a:fontScheme>
+    <a:fmtScheme name="Office">
+      <a:fillStyleLst>
+        <a:solidFill>
+          <a:schemeClr val="phClr"/>
+        </a:solidFill>
+        <a:gradFill rotWithShape="1">
+          <a:gsLst>
+            <a:gs pos="0">
+              <a:schemeClr val="phClr">
+                <a:tint val="50000"/>
+                <a:satMod val="300000"/>
+              </a:schemeClr>
+            </a:gs>
+            <a:gs pos="35000">
+              <a:schemeClr val="phClr">
+                <a:tint val="37000"/>
+                <a:satMod val="300000"/>
+              </a:schemeClr>
+            </a:gs>
+            <a:gs pos="100000">
+              <a:schemeClr val="phClr">
+                <a:tint val="15000"/>
+                <a:satMod val="350000"/>
+              </a:schemeClr>
+            </a:gs>
+          </a:gsLst>
+          <a:lin ang="16200000" scaled="1"/>
+        </a:gradFill>
+        <a:gradFill rotWithShape="1">
+          <a:gsLst>
+            <a:gs pos="0">
+              <a:schemeClr val="phClr">
+                <a:shade val="51000"/>
+                <a:satMod val="130000"/>
+              </a:schemeClr>
+            </a:gs>
+            <a:gs pos="80000">
+              <a:schemeClr val="phClr">
+                <a:shade val="93000"/>
+                <a:satMod val="130000"/>
+              </a:schemeClr>
+            </a:gs>
+            <a:gs pos="100000">
+              <a:schemeClr val="phClr">
+                <a:shade val="94000"/>
+                <a:satMod val="135000"/>
+              </a:schemeClr>
+            </a:gs>
+          </a:gsLst>
+          <a:lin ang="16200000" scaled="0"/>
+        </a:gradFill>
+      </a:fillStyleLst>
+      <a:lnStyleLst>
+        <a:ln w="9525" cap="flat" cmpd="sng" algn="ctr">
+          <a:solidFill>
+            <a:schemeClr val="phClr">
+              <a:shade val="95000"/>
+              <a:satMod val="105000"/>
+            </a:schemeClr>
+          </a:solidFill>
+          <a:prstDash val="solid"/>
+        </a:ln>
+        <a:ln w="25400" cap="flat" cmpd="sng" algn="ctr">
+          <a:solidFill>
+            <a:schemeClr val="phClr"/>
+          </a:solidFill>
+          <a:prstDash val="solid"/>
+        </a:ln>
+        <a:ln w="38100" cap="flat" cmpd="sng" algn="ctr">
+          <a:solidFill>
+            <a:schemeClr val="phClr"/>
+          </a:solidFill>
+          <a:prstDash val="solid"/>
+        </a:ln>
+      </a:lnStyleLst>
+      <a:effectStyleLst>
+        <a:effectStyle>
+          <a:effectLst>
+            <a:outerShdw blurRad="40000" dist="20000" dir="5400000" rotWithShape="0">
+              <a:srgbClr val="000000">
+                <a:alpha val="38000"/>
+              </a:srgbClr>
+            </a:outerShdw>
+          </a:effectLst>
+        </a:effectStyle>
+        <a:effectStyle>
+          <a:effectLst>
+            <a:outerShdw blurRad="40000" dist="23000" dir="5400000" rotWithShape="0">
+              <a:srgbClr val="000000">
+                <a:alpha val="35000"/>
+              </a:srgbClr>
+            </a:outerShdw>
+          </a:effectLst>
+        </a:effectStyle>
+        <a:effectStyle>
+          <a:effectLst>
+            <a:outerShdw blurRad="40000" dist="23000" dir="5400000" rotWithShape="0">
+              <a:srgbClr val="000000">
+                <a:alpha val="35000"/>
+              </a:srgbClr>
+            </a:outerShdw>
+          </a:effectLst>
+          <a:scene3d>
+            <a:camera prst="orthographicFront">
+              <a:rot lat="0" lon="0" rev="0"/>
+            </a:camera>
+            <a:lightRig rig="threePt" dir="t">
+              <a:rot lat="0" lon="0" rev="1200000"/>
+            </a:lightRig>
+          </a:scene3d>
+          <a:sp3d>
+            <a:bevelT w="63500" h="25400"/>
+          </a:sp3d>
+        </a:effectStyle>
+      </a:effectStyleLst>
+      <a:bgFillStyleLst>
+        <a:solidFill>
+          <a:schemeClr val="phClr"/>
+        </a:solidFill>
+        <a:gradFill rotWithShape="1">
+          <a:gsLst>
+            <a:gs pos="0">
+              <a:schemeClr val="phClr">
+                <a:tint val="40000"/>
+                <a:satMod val="350000"/>
+              </a:schemeClr>
+            </a:gs>
+            <a:gs pos="40000">
+              <a:schemeClr val="phClr">
+                <a:tint val="45000"/>
+                <a:shade val="99000"/>
+                <a:satMod val="350000"/>
+              </a:schemeClr>
+            </a:gs>
+            <a:gs pos="100000">
+              <a:schemeClr val="phClr">
+                <a:shade val="20000"/>
+                <a:satMod val="255000"/>
+              </a:schemeClr>
+            </a:gs>
+          </a:gsLst>
+          <a:path path="circle">
+            <a:fillToRect l="50000" t="-80000" r="50000" b="180000"/>
+          </a:path>
+        </a:gradFill>
+        <a:gradFill rotWithShape="1">
+          <a:gsLst>
+            <a:gs pos="0">
+              <a:schemeClr val="phClr">
+                <a:tint val="80000"/>
+                <a:satMod val="300000"/>
+              </a:schemeClr>
+            </a:gs>
+            <a:gs pos="100000">
+              <a:schemeClr val="phClr">
+                <a:shade val="30000"/>
+                <a:satMod val="200000"/>
+              </a:schemeClr>
+            </a:gs>
+          </a:gsLst>
+          <a:path path="circle">
+            <a:fillToRect l="50000" t="50000" r="50000" b="50000"/>
+          </a:path>
+        </a:gradFill>
+      </a:bgFillStyleLst>
+    </a:fmtScheme>
+  </a:themeElements>
+</a:theme>
 </file>
</xml_diff>